<commit_message>
Update user and developer guide
</commit_message>
<xml_diff>
--- a/docs/diagrams/Diagrams.pptx
+++ b/docs/diagrams/Diagrams.pptx
@@ -5,18 +5,19 @@
     <p:sldMasterId id="2147483659" r:id="rId1"/>
   </p:sldMasterIdLst>
   <p:notesMasterIdLst>
-    <p:notesMasterId r:id="rId11"/>
+    <p:notesMasterId r:id="rId12"/>
   </p:notesMasterIdLst>
   <p:sldIdLst>
     <p:sldId id="256" r:id="rId2"/>
     <p:sldId id="257" r:id="rId3"/>
     <p:sldId id="258" r:id="rId4"/>
     <p:sldId id="259" r:id="rId5"/>
-    <p:sldId id="260" r:id="rId6"/>
-    <p:sldId id="261" r:id="rId7"/>
-    <p:sldId id="262" r:id="rId8"/>
-    <p:sldId id="263" r:id="rId9"/>
-    <p:sldId id="264" r:id="rId10"/>
+    <p:sldId id="265" r:id="rId6"/>
+    <p:sldId id="260" r:id="rId7"/>
+    <p:sldId id="261" r:id="rId8"/>
+    <p:sldId id="262" r:id="rId9"/>
+    <p:sldId id="263" r:id="rId10"/>
+    <p:sldId id="264" r:id="rId11"/>
   </p:sldIdLst>
   <p:sldSz cx="9144000" cy="6858000" type="screen4x3"/>
   <p:notesSz cx="6858000" cy="9144000"/>
@@ -1015,6 +1016,13 @@
                 <a:cs typeface="Calibri"/>
                 <a:sym typeface="Calibri"/>
               </a:rPr>
+              <a:pPr marL="0" marR="0" lvl="0" indent="0" algn="r" rtl="0">
+                <a:spcBef>
+                  <a:spcPts val="0"/>
+                </a:spcBef>
+                <a:buSzPct val="25000"/>
+                <a:buNone/>
+              </a:pPr>
               <a:t>‹#›</a:t>
             </a:fld>
             <a:endParaRPr lang="en-US" sz="1200" b="0" i="0" u="none" strike="noStrike" cap="none">
@@ -1228,6 +1236,107 @@
 </p:notes>
 </file>
 
+<file path=ppt/notesSlides/notesSlide10.xml><?xml version="1.0" encoding="utf-8"?>
+<p:notes xmlns:a="http://schemas.openxmlformats.org/drawingml/2006/main" xmlns:r="http://schemas.openxmlformats.org/officeDocument/2006/relationships" xmlns:p="http://schemas.openxmlformats.org/presentationml/2006/main" showMasterSp="0" showMasterPhAnim="0">
+  <p:cSld>
+    <p:spTree>
+      <p:nvGrpSpPr>
+        <p:cNvPr id="1" name="Shape 386"/>
+        <p:cNvGrpSpPr/>
+        <p:nvPr/>
+      </p:nvGrpSpPr>
+      <p:grpSpPr>
+        <a:xfrm>
+          <a:off x="0" y="0"/>
+          <a:ext cx="0" cy="0"/>
+          <a:chOff x="0" y="0"/>
+          <a:chExt cx="0" cy="0"/>
+        </a:xfrm>
+      </p:grpSpPr>
+      <p:sp>
+        <p:nvSpPr>
+          <p:cNvPr id="387" name="Shape 387"/>
+          <p:cNvSpPr txBox="1">
+            <a:spLocks noGrp="1"/>
+          </p:cNvSpPr>
+          <p:nvPr>
+            <p:ph type="body" idx="1"/>
+          </p:nvPr>
+        </p:nvSpPr>
+        <p:spPr>
+          <a:xfrm>
+            <a:off x="685800" y="4343400"/>
+            <a:ext cx="5486399" cy="4114800"/>
+          </a:xfrm>
+          <a:prstGeom prst="rect">
+            <a:avLst/>
+          </a:prstGeom>
+        </p:spPr>
+        <p:txBody>
+          <a:bodyPr lIns="91425" tIns="91425" rIns="91425" bIns="91425" anchor="t" anchorCtr="0">
+            <a:noAutofit/>
+          </a:bodyPr>
+          <a:lstStyle/>
+          <a:p>
+            <a:pPr lvl="0">
+              <a:spcBef>
+                <a:spcPts val="0"/>
+              </a:spcBef>
+              <a:buNone/>
+            </a:pPr>
+            <a:endParaRPr/>
+          </a:p>
+        </p:txBody>
+      </p:sp>
+      <p:sp>
+        <p:nvSpPr>
+          <p:cNvPr id="388" name="Shape 388"/>
+          <p:cNvSpPr>
+            <a:spLocks noGrp="1" noRot="1" noChangeAspect="1"/>
+          </p:cNvSpPr>
+          <p:nvPr>
+            <p:ph type="sldImg" idx="2"/>
+          </p:nvPr>
+        </p:nvSpPr>
+        <p:spPr>
+          <a:xfrm>
+            <a:off x="1143000" y="685800"/>
+            <a:ext cx="4572000" cy="3429000"/>
+          </a:xfrm>
+          <a:custGeom>
+            <a:avLst/>
+            <a:gdLst/>
+            <a:ahLst/>
+            <a:cxnLst/>
+            <a:rect l="0" t="0" r="0" b="0"/>
+            <a:pathLst>
+              <a:path w="120000" h="120000" extrusionOk="0">
+                <a:moveTo>
+                  <a:pt x="0" y="0"/>
+                </a:moveTo>
+                <a:lnTo>
+                  <a:pt x="120000" y="0"/>
+                </a:lnTo>
+                <a:lnTo>
+                  <a:pt x="120000" y="120000"/>
+                </a:lnTo>
+                <a:lnTo>
+                  <a:pt x="0" y="120000"/>
+                </a:lnTo>
+                <a:close/>
+              </a:path>
+            </a:pathLst>
+          </a:custGeom>
+        </p:spPr>
+      </p:sp>
+    </p:spTree>
+  </p:cSld>
+  <p:clrMapOvr>
+    <a:masterClrMapping/>
+  </p:clrMapOvr>
+</p:notes>
+</file>
+
 <file path=ppt/notesSlides/notesSlide2.xml><?xml version="1.0" encoding="utf-8"?>
 <p:notes xmlns:a="http://schemas.openxmlformats.org/drawingml/2006/main" xmlns:r="http://schemas.openxmlformats.org/officeDocument/2006/relationships" xmlns:p="http://schemas.openxmlformats.org/presentationml/2006/main" showMasterSp="0" showMasterPhAnim="0">
   <p:cSld>
@@ -1536,6 +1645,107 @@
   <p:cSld>
     <p:spTree>
       <p:nvGrpSpPr>
+        <p:cNvPr id="1" name="Shape 182"/>
+        <p:cNvGrpSpPr/>
+        <p:nvPr/>
+      </p:nvGrpSpPr>
+      <p:grpSpPr>
+        <a:xfrm>
+          <a:off x="0" y="0"/>
+          <a:ext cx="0" cy="0"/>
+          <a:chOff x="0" y="0"/>
+          <a:chExt cx="0" cy="0"/>
+        </a:xfrm>
+      </p:grpSpPr>
+      <p:sp>
+        <p:nvSpPr>
+          <p:cNvPr id="183" name="Shape 183"/>
+          <p:cNvSpPr txBox="1">
+            <a:spLocks noGrp="1"/>
+          </p:cNvSpPr>
+          <p:nvPr>
+            <p:ph type="body" idx="1"/>
+          </p:nvPr>
+        </p:nvSpPr>
+        <p:spPr>
+          <a:xfrm>
+            <a:off x="685800" y="4343400"/>
+            <a:ext cx="5486399" cy="4114800"/>
+          </a:xfrm>
+          <a:prstGeom prst="rect">
+            <a:avLst/>
+          </a:prstGeom>
+        </p:spPr>
+        <p:txBody>
+          <a:bodyPr lIns="91425" tIns="91425" rIns="91425" bIns="91425" anchor="t" anchorCtr="0">
+            <a:noAutofit/>
+          </a:bodyPr>
+          <a:lstStyle/>
+          <a:p>
+            <a:pPr lvl="0">
+              <a:spcBef>
+                <a:spcPts val="0"/>
+              </a:spcBef>
+              <a:buNone/>
+            </a:pPr>
+            <a:endParaRPr/>
+          </a:p>
+        </p:txBody>
+      </p:sp>
+      <p:sp>
+        <p:nvSpPr>
+          <p:cNvPr id="184" name="Shape 184"/>
+          <p:cNvSpPr>
+            <a:spLocks noGrp="1" noRot="1" noChangeAspect="1"/>
+          </p:cNvSpPr>
+          <p:nvPr>
+            <p:ph type="sldImg" idx="2"/>
+          </p:nvPr>
+        </p:nvSpPr>
+        <p:spPr>
+          <a:xfrm>
+            <a:off x="1143000" y="685800"/>
+            <a:ext cx="4572000" cy="3429000"/>
+          </a:xfrm>
+          <a:custGeom>
+            <a:avLst/>
+            <a:gdLst/>
+            <a:ahLst/>
+            <a:cxnLst/>
+            <a:rect l="0" t="0" r="0" b="0"/>
+            <a:pathLst>
+              <a:path w="120000" h="120000" extrusionOk="0">
+                <a:moveTo>
+                  <a:pt x="0" y="0"/>
+                </a:moveTo>
+                <a:lnTo>
+                  <a:pt x="120000" y="0"/>
+                </a:lnTo>
+                <a:lnTo>
+                  <a:pt x="120000" y="120000"/>
+                </a:lnTo>
+                <a:lnTo>
+                  <a:pt x="0" y="120000"/>
+                </a:lnTo>
+                <a:close/>
+              </a:path>
+            </a:pathLst>
+          </a:custGeom>
+        </p:spPr>
+      </p:sp>
+    </p:spTree>
+  </p:cSld>
+  <p:clrMapOvr>
+    <a:masterClrMapping/>
+  </p:clrMapOvr>
+</p:notes>
+</file>
+
+<file path=ppt/notesSlides/notesSlide6.xml><?xml version="1.0" encoding="utf-8"?>
+<p:notes xmlns:a="http://schemas.openxmlformats.org/drawingml/2006/main" xmlns:r="http://schemas.openxmlformats.org/officeDocument/2006/relationships" xmlns:p="http://schemas.openxmlformats.org/presentationml/2006/main" showMasterSp="0" showMasterPhAnim="0">
+  <p:cSld>
+    <p:spTree>
+      <p:nvGrpSpPr>
         <p:cNvPr id="1" name="Shape 229"/>
         <p:cNvGrpSpPr/>
         <p:nvPr/>
@@ -1632,7 +1842,7 @@
 </p:notes>
 </file>
 
-<file path=ppt/notesSlides/notesSlide6.xml><?xml version="1.0" encoding="utf-8"?>
+<file path=ppt/notesSlides/notesSlide7.xml><?xml version="1.0" encoding="utf-8"?>
 <p:notes xmlns:a="http://schemas.openxmlformats.org/drawingml/2006/main" xmlns:r="http://schemas.openxmlformats.org/officeDocument/2006/relationships" xmlns:p="http://schemas.openxmlformats.org/presentationml/2006/main" showMasterSp="0" showMasterPhAnim="0">
   <p:cSld>
     <p:spTree>
@@ -1733,7 +1943,7 @@
 </p:notes>
 </file>
 
-<file path=ppt/notesSlides/notesSlide7.xml><?xml version="1.0" encoding="utf-8"?>
+<file path=ppt/notesSlides/notesSlide8.xml><?xml version="1.0" encoding="utf-8"?>
 <p:notes xmlns:a="http://schemas.openxmlformats.org/drawingml/2006/main" xmlns:r="http://schemas.openxmlformats.org/officeDocument/2006/relationships" xmlns:p="http://schemas.openxmlformats.org/presentationml/2006/main" showMasterSp="0" showMasterPhAnim="0">
   <p:cSld>
     <p:spTree>
@@ -1834,7 +2044,7 @@
 </p:notes>
 </file>
 
-<file path=ppt/notesSlides/notesSlide8.xml><?xml version="1.0" encoding="utf-8"?>
+<file path=ppt/notesSlides/notesSlide9.xml><?xml version="1.0" encoding="utf-8"?>
 <p:notes xmlns:a="http://schemas.openxmlformats.org/drawingml/2006/main" xmlns:r="http://schemas.openxmlformats.org/officeDocument/2006/relationships" xmlns:p="http://schemas.openxmlformats.org/presentationml/2006/main" showMasterSp="0" showMasterPhAnim="0">
   <p:cSld>
     <p:spTree>
@@ -1889,107 +2099,6 @@
       <p:sp>
         <p:nvSpPr>
           <p:cNvPr id="360" name="Shape 360"/>
-          <p:cNvSpPr>
-            <a:spLocks noGrp="1" noRot="1" noChangeAspect="1"/>
-          </p:cNvSpPr>
-          <p:nvPr>
-            <p:ph type="sldImg" idx="2"/>
-          </p:nvPr>
-        </p:nvSpPr>
-        <p:spPr>
-          <a:xfrm>
-            <a:off x="1143000" y="685800"/>
-            <a:ext cx="4572000" cy="3429000"/>
-          </a:xfrm>
-          <a:custGeom>
-            <a:avLst/>
-            <a:gdLst/>
-            <a:ahLst/>
-            <a:cxnLst/>
-            <a:rect l="0" t="0" r="0" b="0"/>
-            <a:pathLst>
-              <a:path w="120000" h="120000" extrusionOk="0">
-                <a:moveTo>
-                  <a:pt x="0" y="0"/>
-                </a:moveTo>
-                <a:lnTo>
-                  <a:pt x="120000" y="0"/>
-                </a:lnTo>
-                <a:lnTo>
-                  <a:pt x="120000" y="120000"/>
-                </a:lnTo>
-                <a:lnTo>
-                  <a:pt x="0" y="120000"/>
-                </a:lnTo>
-                <a:close/>
-              </a:path>
-            </a:pathLst>
-          </a:custGeom>
-        </p:spPr>
-      </p:sp>
-    </p:spTree>
-  </p:cSld>
-  <p:clrMapOvr>
-    <a:masterClrMapping/>
-  </p:clrMapOvr>
-</p:notes>
-</file>
-
-<file path=ppt/notesSlides/notesSlide9.xml><?xml version="1.0" encoding="utf-8"?>
-<p:notes xmlns:a="http://schemas.openxmlformats.org/drawingml/2006/main" xmlns:r="http://schemas.openxmlformats.org/officeDocument/2006/relationships" xmlns:p="http://schemas.openxmlformats.org/presentationml/2006/main" showMasterSp="0" showMasterPhAnim="0">
-  <p:cSld>
-    <p:spTree>
-      <p:nvGrpSpPr>
-        <p:cNvPr id="1" name="Shape 386"/>
-        <p:cNvGrpSpPr/>
-        <p:nvPr/>
-      </p:nvGrpSpPr>
-      <p:grpSpPr>
-        <a:xfrm>
-          <a:off x="0" y="0"/>
-          <a:ext cx="0" cy="0"/>
-          <a:chOff x="0" y="0"/>
-          <a:chExt cx="0" cy="0"/>
-        </a:xfrm>
-      </p:grpSpPr>
-      <p:sp>
-        <p:nvSpPr>
-          <p:cNvPr id="387" name="Shape 387"/>
-          <p:cNvSpPr txBox="1">
-            <a:spLocks noGrp="1"/>
-          </p:cNvSpPr>
-          <p:nvPr>
-            <p:ph type="body" idx="1"/>
-          </p:nvPr>
-        </p:nvSpPr>
-        <p:spPr>
-          <a:xfrm>
-            <a:off x="685800" y="4343400"/>
-            <a:ext cx="5486399" cy="4114800"/>
-          </a:xfrm>
-          <a:prstGeom prst="rect">
-            <a:avLst/>
-          </a:prstGeom>
-        </p:spPr>
-        <p:txBody>
-          <a:bodyPr lIns="91425" tIns="91425" rIns="91425" bIns="91425" anchor="t" anchorCtr="0">
-            <a:noAutofit/>
-          </a:bodyPr>
-          <a:lstStyle/>
-          <a:p>
-            <a:pPr lvl="0">
-              <a:spcBef>
-                <a:spcPts val="0"/>
-              </a:spcBef>
-              <a:buNone/>
-            </a:pPr>
-            <a:endParaRPr/>
-          </a:p>
-        </p:txBody>
-      </p:sp>
-      <p:sp>
-        <p:nvSpPr>
-          <p:cNvPr id="388" name="Shape 388"/>
           <p:cNvSpPr>
             <a:spLocks noGrp="1" noRot="1" noChangeAspect="1"/>
           </p:cNvSpPr>
@@ -2743,6 +2852,13 @@
                 <a:cs typeface="Calibri"/>
                 <a:sym typeface="Calibri"/>
               </a:rPr>
+              <a:pPr marL="0" marR="0" lvl="0" indent="0" algn="r" rtl="0">
+                <a:spcBef>
+                  <a:spcPts val="0"/>
+                </a:spcBef>
+                <a:buSzPct val="25000"/>
+                <a:buNone/>
+              </a:pPr>
               <a:t>‹#›</a:t>
             </a:fld>
             <a:endParaRPr lang="en-US" sz="1200" b="0" i="0" u="none" strike="noStrike" cap="none">
@@ -3481,6 +3597,13 @@
                 <a:cs typeface="Calibri"/>
                 <a:sym typeface="Calibri"/>
               </a:rPr>
+              <a:pPr marL="0" marR="0" lvl="0" indent="0" algn="r" rtl="0">
+                <a:spcBef>
+                  <a:spcPts val="0"/>
+                </a:spcBef>
+                <a:buSzPct val="25000"/>
+                <a:buNone/>
+              </a:pPr>
               <a:t>‹#›</a:t>
             </a:fld>
             <a:endParaRPr lang="en-US" sz="1200">
@@ -4219,6 +4342,13 @@
                 <a:cs typeface="Calibri"/>
                 <a:sym typeface="Calibri"/>
               </a:rPr>
+              <a:pPr marL="0" marR="0" lvl="0" indent="0" algn="r" rtl="0">
+                <a:spcBef>
+                  <a:spcPts val="0"/>
+                </a:spcBef>
+                <a:buSzPct val="25000"/>
+                <a:buNone/>
+              </a:pPr>
               <a:t>‹#›</a:t>
             </a:fld>
             <a:endParaRPr lang="en-US" sz="1200">
@@ -4638,6 +4768,13 @@
                 <a:cs typeface="Calibri"/>
                 <a:sym typeface="Calibri"/>
               </a:rPr>
+              <a:pPr marL="0" marR="0" lvl="0" indent="0" algn="r" rtl="0">
+                <a:spcBef>
+                  <a:spcPts val="0"/>
+                </a:spcBef>
+                <a:buSzPct val="25000"/>
+                <a:buNone/>
+              </a:pPr>
               <a:t>‹#›</a:t>
             </a:fld>
             <a:endParaRPr lang="en-US" sz="1200" b="0" i="0" u="none" strike="noStrike" cap="none">
@@ -5376,6 +5513,13 @@
                 <a:cs typeface="Calibri"/>
                 <a:sym typeface="Calibri"/>
               </a:rPr>
+              <a:pPr marL="0" marR="0" lvl="0" indent="0" algn="r" rtl="0">
+                <a:spcBef>
+                  <a:spcPts val="0"/>
+                </a:spcBef>
+                <a:buSzPct val="25000"/>
+                <a:buNone/>
+              </a:pPr>
               <a:t>‹#›</a:t>
             </a:fld>
             <a:endParaRPr lang="en-US" sz="1200">
@@ -6105,6 +6249,13 @@
                 <a:cs typeface="Calibri"/>
                 <a:sym typeface="Calibri"/>
               </a:rPr>
+              <a:pPr marL="0" marR="0" lvl="0" indent="0" algn="r" rtl="0">
+                <a:spcBef>
+                  <a:spcPts val="0"/>
+                </a:spcBef>
+                <a:buSzPct val="25000"/>
+                <a:buNone/>
+              </a:pPr>
               <a:t>‹#›</a:t>
             </a:fld>
             <a:endParaRPr lang="en-US" sz="1200">
@@ -7055,6 +7206,13 @@
                 <a:cs typeface="Calibri"/>
                 <a:sym typeface="Calibri"/>
               </a:rPr>
+              <a:pPr marL="0" marR="0" lvl="0" indent="0" algn="r" rtl="0">
+                <a:spcBef>
+                  <a:spcPts val="0"/>
+                </a:spcBef>
+                <a:buSzPct val="25000"/>
+                <a:buNone/>
+              </a:pPr>
               <a:t>‹#›</a:t>
             </a:fld>
             <a:endParaRPr lang="en-US" sz="1200">
@@ -8411,6 +8569,13 @@
                 <a:cs typeface="Calibri"/>
                 <a:sym typeface="Calibri"/>
               </a:rPr>
+              <a:pPr marL="0" marR="0" lvl="0" indent="0" algn="r" rtl="0">
+                <a:spcBef>
+                  <a:spcPts val="0"/>
+                </a:spcBef>
+                <a:buSzPct val="25000"/>
+                <a:buNone/>
+              </a:pPr>
               <a:t>‹#›</a:t>
             </a:fld>
             <a:endParaRPr lang="en-US" sz="1200">
@@ -8937,6 +9102,13 @@
                 <a:cs typeface="Calibri"/>
                 <a:sym typeface="Calibri"/>
               </a:rPr>
+              <a:pPr marL="0" marR="0" lvl="0" indent="0" algn="r" rtl="0">
+                <a:spcBef>
+                  <a:spcPts val="0"/>
+                </a:spcBef>
+                <a:buSzPct val="25000"/>
+                <a:buNone/>
+              </a:pPr>
               <a:t>‹#›</a:t>
             </a:fld>
             <a:endParaRPr lang="en-US" sz="1200">
@@ -9878,6 +10050,13 @@
                 <a:cs typeface="Calibri"/>
                 <a:sym typeface="Calibri"/>
               </a:rPr>
+              <a:pPr marL="0" marR="0" lvl="0" indent="0" algn="r" rtl="0">
+                <a:spcBef>
+                  <a:spcPts val="0"/>
+                </a:spcBef>
+                <a:buSzPct val="25000"/>
+                <a:buNone/>
+              </a:pPr>
               <a:t>‹#›</a:t>
             </a:fld>
             <a:endParaRPr lang="en-US" sz="1200">
@@ -10810,6 +10989,13 @@
                 <a:cs typeface="Calibri"/>
                 <a:sym typeface="Calibri"/>
               </a:rPr>
+              <a:pPr marL="0" marR="0" lvl="0" indent="0" algn="r" rtl="0">
+                <a:spcBef>
+                  <a:spcPts val="0"/>
+                </a:spcBef>
+                <a:buSzPct val="25000"/>
+                <a:buNone/>
+              </a:pPr>
               <a:t>‹#›</a:t>
             </a:fld>
             <a:endParaRPr lang="en-US" sz="1200">
@@ -11556,6 +11742,13 @@
                 <a:cs typeface="Calibri"/>
                 <a:sym typeface="Calibri"/>
               </a:rPr>
+              <a:pPr marL="0" marR="0" lvl="0" indent="0" algn="r" rtl="0">
+                <a:spcBef>
+                  <a:spcPts val="0"/>
+                </a:spcBef>
+                <a:buSzPct val="25000"/>
+                <a:buNone/>
+              </a:pPr>
               <a:t>‹#›</a:t>
             </a:fld>
             <a:endParaRPr lang="en-US" sz="1200" b="0" i="0" u="none" strike="noStrike" cap="none">
@@ -12186,6 +12379,31 @@
 </p:sld>
 </file>
 
+<file path=ppt/slides/slide10.xml><?xml version="1.0" encoding="utf-8"?>
+<p:sld xmlns:a="http://schemas.openxmlformats.org/drawingml/2006/main" xmlns:r="http://schemas.openxmlformats.org/officeDocument/2006/relationships" xmlns:p="http://schemas.openxmlformats.org/presentationml/2006/main">
+  <p:cSld>
+    <p:spTree>
+      <p:nvGrpSpPr>
+        <p:cNvPr id="1" name="Shape 389"/>
+        <p:cNvGrpSpPr/>
+        <p:nvPr/>
+      </p:nvGrpSpPr>
+      <p:grpSpPr>
+        <a:xfrm>
+          <a:off x="0" y="0"/>
+          <a:ext cx="0" cy="0"/>
+          <a:chOff x="0" y="0"/>
+          <a:chExt cx="0" cy="0"/>
+        </a:xfrm>
+      </p:grpSpPr>
+    </p:spTree>
+  </p:cSld>
+  <p:clrMapOvr>
+    <a:masterClrMapping/>
+  </p:clrMapOvr>
+</p:sld>
+</file>
+
 <file path=ppt/slides/slide2.xml><?xml version="1.0" encoding="utf-8"?>
 <p:sld xmlns:a="http://schemas.openxmlformats.org/drawingml/2006/main" xmlns:r="http://schemas.openxmlformats.org/officeDocument/2006/relationships" xmlns:p="http://schemas.openxmlformats.org/presentationml/2006/main">
   <p:cSld>
@@ -18040,6 +18258,2440 @@
   <p:cSld>
     <p:spTree>
       <p:nvGrpSpPr>
+        <p:cNvPr id="1" name="Shape 185"/>
+        <p:cNvGrpSpPr/>
+        <p:nvPr/>
+      </p:nvGrpSpPr>
+      <p:grpSpPr>
+        <a:xfrm>
+          <a:off x="0" y="0"/>
+          <a:ext cx="0" cy="0"/>
+          <a:chOff x="0" y="0"/>
+          <a:chExt cx="0" cy="0"/>
+        </a:xfrm>
+      </p:grpSpPr>
+      <p:sp>
+        <p:nvSpPr>
+          <p:cNvPr id="186" name="Shape 186"/>
+          <p:cNvSpPr/>
+          <p:nvPr/>
+        </p:nvSpPr>
+        <p:spPr>
+          <a:xfrm>
+            <a:off x="1217465" y="1447800"/>
+            <a:ext cx="4917083" cy="3962399"/>
+          </a:xfrm>
+          <a:prstGeom prst="roundRect">
+            <a:avLst>
+              <a:gd name="adj" fmla="val 3484"/>
+            </a:avLst>
+          </a:prstGeom>
+          <a:solidFill>
+            <a:srgbClr val="F1F5E9"/>
+          </a:solidFill>
+          <a:ln>
+            <a:noFill/>
+          </a:ln>
+        </p:spPr>
+        <p:txBody>
+          <a:bodyPr lIns="91425" tIns="45700" rIns="91425" bIns="45700" anchor="t" anchorCtr="0">
+            <a:noAutofit/>
+          </a:bodyPr>
+          <a:lstStyle/>
+          <a:p>
+            <a:pPr marL="0" marR="0" lvl="0" indent="0" algn="l" rtl="0">
+              <a:spcBef>
+                <a:spcPts val="0"/>
+              </a:spcBef>
+              <a:buSzPct val="25000"/>
+              <a:buNone/>
+            </a:pPr>
+            <a:r>
+              <a:rPr lang="en-US" sz="1200" b="1">
+                <a:solidFill>
+                  <a:srgbClr val="76923C"/>
+                </a:solidFill>
+                <a:latin typeface="Calibri"/>
+                <a:ea typeface="Calibri"/>
+                <a:cs typeface="Calibri"/>
+                <a:sym typeface="Calibri"/>
+              </a:rPr>
+              <a:t>UI</a:t>
+            </a:r>
+          </a:p>
+        </p:txBody>
+      </p:sp>
+      <p:sp>
+        <p:nvSpPr>
+          <p:cNvPr id="187" name="Shape 187"/>
+          <p:cNvSpPr/>
+          <p:nvPr/>
+        </p:nvSpPr>
+        <p:spPr>
+          <a:xfrm>
+            <a:off x="2095948" y="2341219"/>
+            <a:ext cx="1093634" cy="346760"/>
+          </a:xfrm>
+          <a:prstGeom prst="rect">
+            <a:avLst/>
+          </a:prstGeom>
+          <a:gradFill>
+            <a:gsLst>
+              <a:gs pos="0">
+                <a:srgbClr val="DAFEA4"/>
+              </a:gs>
+              <a:gs pos="35000">
+                <a:srgbClr val="E3FEBF"/>
+              </a:gs>
+              <a:gs pos="100000">
+                <a:srgbClr val="F4FEE6"/>
+              </a:gs>
+            </a:gsLst>
+            <a:lin ang="16200000" scaled="0"/>
+          </a:gradFill>
+          <a:ln w="19050" cap="flat" cmpd="sng">
+            <a:solidFill>
+              <a:schemeClr val="accent3"/>
+            </a:solidFill>
+            <a:prstDash val="solid"/>
+            <a:round/>
+            <a:headEnd type="none" w="med" len="med"/>
+            <a:tailEnd type="none" w="med" len="med"/>
+          </a:ln>
+        </p:spPr>
+        <p:txBody>
+          <a:bodyPr lIns="91425" tIns="45700" rIns="91425" bIns="45700" anchor="ctr" anchorCtr="0">
+            <a:noAutofit/>
+          </a:bodyPr>
+          <a:lstStyle/>
+          <a:p>
+            <a:pPr marL="0" marR="0" lvl="0" indent="0" algn="ctr" rtl="0">
+              <a:spcBef>
+                <a:spcPts val="0"/>
+              </a:spcBef>
+              <a:buSzPct val="25000"/>
+              <a:buNone/>
+            </a:pPr>
+            <a:r>
+              <a:rPr lang="en-US" sz="1050" b="1">
+                <a:solidFill>
+                  <a:srgbClr val="76923C"/>
+                </a:solidFill>
+                <a:latin typeface="Calibri"/>
+                <a:ea typeface="Calibri"/>
+                <a:cs typeface="Calibri"/>
+                <a:sym typeface="Calibri"/>
+              </a:rPr>
+              <a:t>MainWindow</a:t>
+            </a:r>
+          </a:p>
+        </p:txBody>
+      </p:sp>
+      <p:sp>
+        <p:nvSpPr>
+          <p:cNvPr id="188" name="Shape 188"/>
+          <p:cNvSpPr/>
+          <p:nvPr/>
+        </p:nvSpPr>
+        <p:spPr>
+          <a:xfrm>
+            <a:off x="2592527" y="3179159"/>
+            <a:ext cx="1093634" cy="236841"/>
+          </a:xfrm>
+          <a:prstGeom prst="rect">
+            <a:avLst/>
+          </a:prstGeom>
+          <a:gradFill>
+            <a:gsLst>
+              <a:gs pos="0">
+                <a:srgbClr val="DAFEA4"/>
+              </a:gs>
+              <a:gs pos="35000">
+                <a:srgbClr val="E3FEBF"/>
+              </a:gs>
+              <a:gs pos="100000">
+                <a:srgbClr val="F4FEE6"/>
+              </a:gs>
+            </a:gsLst>
+            <a:lin ang="16200000" scaled="0"/>
+          </a:gradFill>
+          <a:ln w="19050" cap="flat" cmpd="sng">
+            <a:solidFill>
+              <a:schemeClr val="accent3"/>
+            </a:solidFill>
+            <a:prstDash val="solid"/>
+            <a:round/>
+            <a:headEnd type="none" w="med" len="med"/>
+            <a:tailEnd type="none" w="med" len="med"/>
+          </a:ln>
+        </p:spPr>
+        <p:txBody>
+          <a:bodyPr lIns="91425" tIns="45700" rIns="91425" bIns="45700" anchor="ctr" anchorCtr="0">
+            <a:noAutofit/>
+          </a:bodyPr>
+          <a:lstStyle/>
+          <a:p>
+            <a:pPr marL="0" marR="0" lvl="0" indent="0" algn="ctr" rtl="0">
+              <a:spcBef>
+                <a:spcPts val="0"/>
+              </a:spcBef>
+              <a:buSzPct val="25000"/>
+              <a:buNone/>
+            </a:pPr>
+            <a:r>
+              <a:rPr lang="en-US" sz="1050" b="1">
+                <a:solidFill>
+                  <a:srgbClr val="76923C"/>
+                </a:solidFill>
+                <a:latin typeface="Calibri"/>
+                <a:ea typeface="Calibri"/>
+                <a:cs typeface="Calibri"/>
+                <a:sym typeface="Calibri"/>
+              </a:rPr>
+              <a:t>CommandBox</a:t>
+            </a:r>
+          </a:p>
+        </p:txBody>
+      </p:sp>
+      <p:sp>
+        <p:nvSpPr>
+          <p:cNvPr id="189" name="Shape 189"/>
+          <p:cNvSpPr/>
+          <p:nvPr/>
+        </p:nvSpPr>
+        <p:spPr>
+          <a:xfrm>
+            <a:off x="2092841" y="1770924"/>
+            <a:ext cx="1093634" cy="346760"/>
+          </a:xfrm>
+          <a:prstGeom prst="rect">
+            <a:avLst/>
+          </a:prstGeom>
+          <a:solidFill>
+            <a:srgbClr val="00B050"/>
+          </a:solidFill>
+          <a:ln w="19050" cap="flat" cmpd="sng">
+            <a:solidFill>
+              <a:srgbClr val="00B050"/>
+            </a:solidFill>
+            <a:prstDash val="solid"/>
+            <a:round/>
+            <a:headEnd type="none" w="med" len="med"/>
+            <a:tailEnd type="none" w="med" len="med"/>
+          </a:ln>
+        </p:spPr>
+        <p:txBody>
+          <a:bodyPr lIns="91425" tIns="45700" rIns="91425" bIns="45700" anchor="ctr" anchorCtr="0">
+            <a:noAutofit/>
+          </a:bodyPr>
+          <a:lstStyle/>
+          <a:p>
+            <a:pPr marL="0" marR="0" lvl="0" indent="0" algn="ctr" rtl="0">
+              <a:spcBef>
+                <a:spcPts val="0"/>
+              </a:spcBef>
+              <a:buSzPct val="25000"/>
+              <a:buNone/>
+            </a:pPr>
+            <a:r>
+              <a:rPr lang="en-US" sz="1050">
+                <a:solidFill>
+                  <a:schemeClr val="lt1"/>
+                </a:solidFill>
+                <a:latin typeface="Calibri"/>
+                <a:ea typeface="Calibri"/>
+                <a:cs typeface="Calibri"/>
+                <a:sym typeface="Calibri"/>
+              </a:rPr>
+              <a:t>UiManager</a:t>
+            </a:r>
+          </a:p>
+        </p:txBody>
+      </p:sp>
+      <p:cxnSp>
+        <p:nvCxnSpPr>
+          <p:cNvPr id="190" name="Shape 190"/>
+          <p:cNvCxnSpPr>
+            <a:stCxn id="189" idx="2"/>
+            <a:endCxn id="187" idx="0"/>
+          </p:cNvCxnSpPr>
+          <p:nvPr/>
+        </p:nvCxnSpPr>
+        <p:spPr>
+          <a:xfrm rot="-5400000" flipH="1">
+            <a:off x="2529409" y="2227934"/>
+            <a:ext cx="223500" cy="3000"/>
+          </a:xfrm>
+          <a:prstGeom prst="bentConnector3">
+            <a:avLst>
+              <a:gd name="adj1" fmla="val 50008"/>
+            </a:avLst>
+          </a:prstGeom>
+          <a:gradFill>
+            <a:gsLst>
+              <a:gs pos="0">
+                <a:srgbClr val="FFA09D"/>
+              </a:gs>
+              <a:gs pos="35000">
+                <a:srgbClr val="FFBCBC"/>
+              </a:gs>
+              <a:gs pos="100000">
+                <a:srgbClr val="FFE2E2"/>
+              </a:gs>
+            </a:gsLst>
+            <a:lin ang="16200000" scaled="0"/>
+          </a:gradFill>
+          <a:ln w="19050" cap="flat" cmpd="sng">
+            <a:solidFill>
+              <a:srgbClr val="00B050"/>
+            </a:solidFill>
+            <a:prstDash val="solid"/>
+            <a:round/>
+            <a:headEnd type="none" w="med" len="med"/>
+            <a:tailEnd type="stealth" w="lg" len="lg"/>
+          </a:ln>
+        </p:spPr>
+      </p:cxnSp>
+      <p:sp>
+        <p:nvSpPr>
+          <p:cNvPr id="191" name="Shape 191"/>
+          <p:cNvSpPr/>
+          <p:nvPr/>
+        </p:nvSpPr>
+        <p:spPr>
+          <a:xfrm flipH="1">
+            <a:off x="5394717" y="2110476"/>
+            <a:ext cx="270503" cy="175522"/>
+          </a:xfrm>
+          <a:prstGeom prst="triangle">
+            <a:avLst>
+              <a:gd name="adj" fmla="val 50000"/>
+            </a:avLst>
+          </a:prstGeom>
+          <a:gradFill>
+            <a:gsLst>
+              <a:gs pos="0">
+                <a:srgbClr val="DAFEA4"/>
+              </a:gs>
+              <a:gs pos="35000">
+                <a:srgbClr val="E3FEBF"/>
+              </a:gs>
+              <a:gs pos="100000">
+                <a:srgbClr val="F4FEE6"/>
+              </a:gs>
+            </a:gsLst>
+            <a:lin ang="16200000" scaled="0"/>
+          </a:gradFill>
+          <a:ln w="9525" cap="flat" cmpd="sng">
+            <a:solidFill>
+              <a:schemeClr val="accent3"/>
+            </a:solidFill>
+            <a:prstDash val="solid"/>
+            <a:round/>
+            <a:headEnd type="none" w="med" len="med"/>
+            <a:tailEnd type="none" w="med" len="med"/>
+          </a:ln>
+        </p:spPr>
+        <p:txBody>
+          <a:bodyPr lIns="91425" tIns="45700" rIns="91425" bIns="45700" anchor="ctr" anchorCtr="0">
+            <a:noAutofit/>
+          </a:bodyPr>
+          <a:lstStyle/>
+          <a:p>
+            <a:pPr marL="0" marR="0" lvl="0" indent="0" algn="ctr" rtl="0">
+              <a:spcBef>
+                <a:spcPts val="0"/>
+              </a:spcBef>
+              <a:buNone/>
+            </a:pPr>
+            <a:endParaRPr sz="1050" b="1">
+              <a:solidFill>
+                <a:srgbClr val="92D050"/>
+              </a:solidFill>
+              <a:latin typeface="Calibri"/>
+              <a:ea typeface="Calibri"/>
+              <a:cs typeface="Calibri"/>
+              <a:sym typeface="Calibri"/>
+            </a:endParaRPr>
+          </a:p>
+        </p:txBody>
+      </p:sp>
+      <p:cxnSp>
+        <p:nvCxnSpPr>
+          <p:cNvPr id="192" name="Shape 192"/>
+          <p:cNvCxnSpPr/>
+          <p:nvPr/>
+        </p:nvCxnSpPr>
+        <p:spPr>
+          <a:xfrm>
+            <a:off x="644735" y="2991938"/>
+            <a:ext cx="684900" cy="599"/>
+          </a:xfrm>
+          <a:prstGeom prst="bentConnector3">
+            <a:avLst>
+              <a:gd name="adj1" fmla="val 50000"/>
+            </a:avLst>
+          </a:prstGeom>
+          <a:gradFill>
+            <a:gsLst>
+              <a:gs pos="0">
+                <a:srgbClr val="FFA09D"/>
+              </a:gs>
+              <a:gs pos="35000">
+                <a:srgbClr val="FFBCBC"/>
+              </a:gs>
+              <a:gs pos="100000">
+                <a:srgbClr val="FFE2E2"/>
+              </a:gs>
+            </a:gsLst>
+            <a:lin ang="16200000" scaled="0"/>
+          </a:gradFill>
+          <a:ln w="19050" cap="flat" cmpd="sng">
+            <a:solidFill>
+              <a:srgbClr val="BFBFBF"/>
+            </a:solidFill>
+            <a:prstDash val="dot"/>
+            <a:round/>
+            <a:headEnd type="none" w="med" len="med"/>
+            <a:tailEnd type="stealth" w="lg" len="lg"/>
+          </a:ln>
+        </p:spPr>
+      </p:cxnSp>
+      <p:sp>
+        <p:nvSpPr>
+          <p:cNvPr id="193" name="Shape 193"/>
+          <p:cNvSpPr/>
+          <p:nvPr/>
+        </p:nvSpPr>
+        <p:spPr>
+          <a:xfrm rot="-5400000">
+            <a:off x="5703829" y="2464877"/>
+            <a:ext cx="2362200" cy="328045"/>
+          </a:xfrm>
+          <a:prstGeom prst="roundRect">
+            <a:avLst>
+              <a:gd name="adj" fmla="val 16667"/>
+            </a:avLst>
+          </a:prstGeom>
+          <a:solidFill>
+            <a:srgbClr val="DAE5F1"/>
+          </a:solidFill>
+          <a:ln>
+            <a:noFill/>
+          </a:ln>
+        </p:spPr>
+        <p:txBody>
+          <a:bodyPr lIns="91425" tIns="45700" rIns="91425" bIns="45700" anchor="ctr" anchorCtr="0">
+            <a:noAutofit/>
+          </a:bodyPr>
+          <a:lstStyle/>
+          <a:p>
+            <a:pPr marL="0" marR="0" lvl="0" indent="0" algn="ctr" rtl="0">
+              <a:spcBef>
+                <a:spcPts val="0"/>
+              </a:spcBef>
+              <a:buSzPct val="25000"/>
+              <a:buNone/>
+            </a:pPr>
+            <a:r>
+              <a:rPr lang="en-US" sz="1100" b="1">
+                <a:solidFill>
+                  <a:schemeClr val="lt1"/>
+                </a:solidFill>
+                <a:latin typeface="Calibri"/>
+                <a:ea typeface="Calibri"/>
+                <a:cs typeface="Calibri"/>
+                <a:sym typeface="Calibri"/>
+              </a:rPr>
+              <a:t>Logic</a:t>
+            </a:r>
+          </a:p>
+        </p:txBody>
+      </p:sp>
+      <p:sp>
+        <p:nvSpPr>
+          <p:cNvPr id="194" name="Shape 194"/>
+          <p:cNvSpPr/>
+          <p:nvPr/>
+        </p:nvSpPr>
+        <p:spPr>
+          <a:xfrm>
+            <a:off x="2592527" y="3649358"/>
+            <a:ext cx="1093634" cy="236841"/>
+          </a:xfrm>
+          <a:prstGeom prst="rect">
+            <a:avLst/>
+          </a:prstGeom>
+          <a:gradFill>
+            <a:gsLst>
+              <a:gs pos="0">
+                <a:srgbClr val="DAFEA4"/>
+              </a:gs>
+              <a:gs pos="35000">
+                <a:srgbClr val="E3FEBF"/>
+              </a:gs>
+              <a:gs pos="100000">
+                <a:srgbClr val="F4FEE6"/>
+              </a:gs>
+            </a:gsLst>
+            <a:lin ang="16200000" scaled="0"/>
+          </a:gradFill>
+          <a:ln w="19050" cap="flat" cmpd="sng">
+            <a:solidFill>
+              <a:schemeClr val="accent3"/>
+            </a:solidFill>
+            <a:prstDash val="solid"/>
+            <a:round/>
+            <a:headEnd type="none" w="med" len="med"/>
+            <a:tailEnd type="none" w="med" len="med"/>
+          </a:ln>
+        </p:spPr>
+        <p:txBody>
+          <a:bodyPr lIns="91425" tIns="45700" rIns="91425" bIns="45700" anchor="ctr" anchorCtr="0">
+            <a:noAutofit/>
+          </a:bodyPr>
+          <a:lstStyle/>
+          <a:p>
+            <a:pPr marL="0" marR="0" lvl="0" indent="0" algn="ctr" rtl="0">
+              <a:spcBef>
+                <a:spcPts val="0"/>
+              </a:spcBef>
+              <a:buSzPct val="25000"/>
+              <a:buNone/>
+            </a:pPr>
+            <a:r>
+              <a:rPr lang="en-US" sz="1050" b="1" dirty="0" err="1" smtClean="0">
+                <a:solidFill>
+                  <a:srgbClr val="76923C"/>
+                </a:solidFill>
+                <a:latin typeface="Calibri"/>
+                <a:ea typeface="Calibri"/>
+                <a:cs typeface="Calibri"/>
+                <a:sym typeface="Calibri"/>
+              </a:rPr>
+              <a:t>Schedule</a:t>
+            </a:r>
+            <a:r>
+              <a:rPr lang="en-US" sz="1050" b="1" dirty="0" err="1" smtClean="0">
+                <a:solidFill>
+                  <a:srgbClr val="76923C"/>
+                </a:solidFill>
+                <a:latin typeface="Calibri"/>
+                <a:ea typeface="Calibri"/>
+                <a:cs typeface="Calibri"/>
+                <a:sym typeface="Calibri"/>
+              </a:rPr>
+              <a:t>Panel</a:t>
+            </a:r>
+            <a:endParaRPr lang="en-US" sz="1050" b="1" dirty="0">
+              <a:solidFill>
+                <a:srgbClr val="76923C"/>
+              </a:solidFill>
+              <a:latin typeface="Calibri"/>
+              <a:ea typeface="Calibri"/>
+              <a:cs typeface="Calibri"/>
+              <a:sym typeface="Calibri"/>
+            </a:endParaRPr>
+          </a:p>
+        </p:txBody>
+      </p:sp>
+      <p:sp>
+        <p:nvSpPr>
+          <p:cNvPr id="195" name="Shape 195"/>
+          <p:cNvSpPr/>
+          <p:nvPr/>
+        </p:nvSpPr>
+        <p:spPr>
+          <a:xfrm>
+            <a:off x="2592526" y="4678058"/>
+            <a:ext cx="1093634" cy="236841"/>
+          </a:xfrm>
+          <a:prstGeom prst="rect">
+            <a:avLst/>
+          </a:prstGeom>
+          <a:gradFill>
+            <a:gsLst>
+              <a:gs pos="0">
+                <a:srgbClr val="DAFEA4"/>
+              </a:gs>
+              <a:gs pos="35000">
+                <a:srgbClr val="E3FEBF"/>
+              </a:gs>
+              <a:gs pos="100000">
+                <a:srgbClr val="F4FEE6"/>
+              </a:gs>
+            </a:gsLst>
+            <a:lin ang="16200000" scaled="0"/>
+          </a:gradFill>
+          <a:ln w="19050" cap="flat" cmpd="sng">
+            <a:solidFill>
+              <a:schemeClr val="accent3"/>
+            </a:solidFill>
+            <a:prstDash val="solid"/>
+            <a:round/>
+            <a:headEnd type="none" w="med" len="med"/>
+            <a:tailEnd type="none" w="med" len="med"/>
+          </a:ln>
+        </p:spPr>
+        <p:txBody>
+          <a:bodyPr lIns="91425" tIns="45700" rIns="91425" bIns="45700" anchor="ctr" anchorCtr="0">
+            <a:noAutofit/>
+          </a:bodyPr>
+          <a:lstStyle/>
+          <a:p>
+            <a:pPr marL="0" marR="0" lvl="0" indent="0" algn="ctr" rtl="0">
+              <a:spcBef>
+                <a:spcPts val="0"/>
+              </a:spcBef>
+              <a:buSzPct val="25000"/>
+              <a:buNone/>
+            </a:pPr>
+            <a:r>
+              <a:rPr lang="en-US" sz="1050" b="1">
+                <a:solidFill>
+                  <a:srgbClr val="76923C"/>
+                </a:solidFill>
+                <a:latin typeface="Calibri"/>
+                <a:ea typeface="Calibri"/>
+                <a:cs typeface="Calibri"/>
+                <a:sym typeface="Calibri"/>
+              </a:rPr>
+              <a:t>StatusBarFooter</a:t>
+            </a:r>
+          </a:p>
+        </p:txBody>
+      </p:sp>
+      <p:sp>
+        <p:nvSpPr>
+          <p:cNvPr id="196" name="Shape 196"/>
+          <p:cNvSpPr/>
+          <p:nvPr/>
+        </p:nvSpPr>
+        <p:spPr>
+          <a:xfrm>
+            <a:off x="2592525" y="3991960"/>
+            <a:ext cx="1093634" cy="236841"/>
+          </a:xfrm>
+          <a:prstGeom prst="rect">
+            <a:avLst/>
+          </a:prstGeom>
+          <a:gradFill>
+            <a:gsLst>
+              <a:gs pos="0">
+                <a:srgbClr val="DAFEA4"/>
+              </a:gs>
+              <a:gs pos="35000">
+                <a:srgbClr val="E3FEBF"/>
+              </a:gs>
+              <a:gs pos="100000">
+                <a:srgbClr val="F4FEE6"/>
+              </a:gs>
+            </a:gsLst>
+            <a:lin ang="16200000" scaled="0"/>
+          </a:gradFill>
+          <a:ln w="19050" cap="flat" cmpd="sng">
+            <a:solidFill>
+              <a:schemeClr val="accent3"/>
+            </a:solidFill>
+            <a:prstDash val="solid"/>
+            <a:round/>
+            <a:headEnd type="none" w="med" len="med"/>
+            <a:tailEnd type="none" w="med" len="med"/>
+          </a:ln>
+        </p:spPr>
+        <p:txBody>
+          <a:bodyPr lIns="91425" tIns="45700" rIns="91425" bIns="45700" anchor="ctr" anchorCtr="0">
+            <a:noAutofit/>
+          </a:bodyPr>
+          <a:lstStyle/>
+          <a:p>
+            <a:pPr marL="0" marR="0" lvl="0" indent="0" algn="ctr" rtl="0">
+              <a:spcBef>
+                <a:spcPts val="0"/>
+              </a:spcBef>
+              <a:buSzPct val="25000"/>
+              <a:buNone/>
+            </a:pPr>
+            <a:r>
+              <a:rPr lang="en-US" sz="1050" b="1" dirty="0" err="1" smtClean="0">
+                <a:solidFill>
+                  <a:srgbClr val="76923C"/>
+                </a:solidFill>
+                <a:latin typeface="Calibri"/>
+                <a:ea typeface="Calibri"/>
+                <a:cs typeface="Calibri"/>
+                <a:sym typeface="Calibri"/>
+              </a:rPr>
+              <a:t>DeadlinePanel</a:t>
+            </a:r>
+            <a:endParaRPr lang="en-US" sz="1050" b="1" dirty="0">
+              <a:solidFill>
+                <a:srgbClr val="76923C"/>
+              </a:solidFill>
+              <a:latin typeface="Calibri"/>
+              <a:ea typeface="Calibri"/>
+              <a:cs typeface="Calibri"/>
+              <a:sym typeface="Calibri"/>
+            </a:endParaRPr>
+          </a:p>
+        </p:txBody>
+      </p:sp>
+      <p:sp>
+        <p:nvSpPr>
+          <p:cNvPr id="198" name="Shape 198"/>
+          <p:cNvSpPr/>
+          <p:nvPr/>
+        </p:nvSpPr>
+        <p:spPr>
+          <a:xfrm>
+            <a:off x="2592527" y="5034580"/>
+            <a:ext cx="1093634" cy="236841"/>
+          </a:xfrm>
+          <a:prstGeom prst="rect">
+            <a:avLst/>
+          </a:prstGeom>
+          <a:gradFill>
+            <a:gsLst>
+              <a:gs pos="0">
+                <a:srgbClr val="DAFEA4"/>
+              </a:gs>
+              <a:gs pos="35000">
+                <a:srgbClr val="E3FEBF"/>
+              </a:gs>
+              <a:gs pos="100000">
+                <a:srgbClr val="F4FEE6"/>
+              </a:gs>
+            </a:gsLst>
+            <a:lin ang="16200000" scaled="0"/>
+          </a:gradFill>
+          <a:ln w="19050" cap="flat" cmpd="sng">
+            <a:solidFill>
+              <a:schemeClr val="accent3"/>
+            </a:solidFill>
+            <a:prstDash val="solid"/>
+            <a:round/>
+            <a:headEnd type="none" w="med" len="med"/>
+            <a:tailEnd type="none" w="med" len="med"/>
+          </a:ln>
+        </p:spPr>
+        <p:txBody>
+          <a:bodyPr lIns="91425" tIns="45700" rIns="91425" bIns="45700" anchor="ctr" anchorCtr="0">
+            <a:noAutofit/>
+          </a:bodyPr>
+          <a:lstStyle/>
+          <a:p>
+            <a:pPr marL="0" marR="0" lvl="0" indent="0" algn="ctr" rtl="0">
+              <a:spcBef>
+                <a:spcPts val="0"/>
+              </a:spcBef>
+              <a:buSzPct val="25000"/>
+              <a:buNone/>
+            </a:pPr>
+            <a:r>
+              <a:rPr lang="en-US" sz="1050" b="1">
+                <a:solidFill>
+                  <a:srgbClr val="76923C"/>
+                </a:solidFill>
+                <a:latin typeface="Calibri"/>
+                <a:ea typeface="Calibri"/>
+                <a:cs typeface="Calibri"/>
+                <a:sym typeface="Calibri"/>
+              </a:rPr>
+              <a:t>HelpWindow</a:t>
+            </a:r>
+          </a:p>
+        </p:txBody>
+      </p:sp>
+      <p:sp>
+        <p:nvSpPr>
+          <p:cNvPr id="199" name="Shape 199"/>
+          <p:cNvSpPr/>
+          <p:nvPr/>
+        </p:nvSpPr>
+        <p:spPr>
+          <a:xfrm>
+            <a:off x="2324548" y="2706451"/>
+            <a:ext cx="183156" cy="161572"/>
+          </a:xfrm>
+          <a:prstGeom prst="flowChartDecision">
+            <a:avLst/>
+          </a:prstGeom>
+          <a:solidFill>
+            <a:schemeClr val="accent3"/>
+          </a:solidFill>
+          <a:ln w="25400" cap="flat" cmpd="sng">
+            <a:solidFill>
+              <a:schemeClr val="accent3"/>
+            </a:solidFill>
+            <a:prstDash val="solid"/>
+            <a:round/>
+            <a:headEnd type="none" w="med" len="med"/>
+            <a:tailEnd type="none" w="med" len="med"/>
+          </a:ln>
+        </p:spPr>
+        <p:txBody>
+          <a:bodyPr lIns="91425" tIns="45700" rIns="91425" bIns="45700" anchor="ctr" anchorCtr="0">
+            <a:noAutofit/>
+          </a:bodyPr>
+          <a:lstStyle/>
+          <a:p>
+            <a:pPr marL="0" marR="0" lvl="0" indent="0" algn="ctr" rtl="0">
+              <a:spcBef>
+                <a:spcPts val="0"/>
+              </a:spcBef>
+              <a:buNone/>
+            </a:pPr>
+            <a:endParaRPr sz="1800">
+              <a:solidFill>
+                <a:schemeClr val="lt1"/>
+              </a:solidFill>
+              <a:latin typeface="Calibri"/>
+              <a:ea typeface="Calibri"/>
+              <a:cs typeface="Calibri"/>
+              <a:sym typeface="Calibri"/>
+            </a:endParaRPr>
+          </a:p>
+        </p:txBody>
+      </p:sp>
+      <p:cxnSp>
+        <p:nvCxnSpPr>
+          <p:cNvPr id="200" name="Shape 200"/>
+          <p:cNvCxnSpPr>
+            <a:stCxn id="199" idx="2"/>
+            <a:endCxn id="188" idx="1"/>
+          </p:cNvCxnSpPr>
+          <p:nvPr/>
+        </p:nvCxnSpPr>
+        <p:spPr>
+          <a:xfrm rot="-5400000" flipH="1">
+            <a:off x="2289526" y="2994624"/>
+            <a:ext cx="429600" cy="176400"/>
+          </a:xfrm>
+          <a:prstGeom prst="bentConnector2">
+            <a:avLst/>
+          </a:prstGeom>
+          <a:gradFill>
+            <a:gsLst>
+              <a:gs pos="0">
+                <a:srgbClr val="FFA09D"/>
+              </a:gs>
+              <a:gs pos="35000">
+                <a:srgbClr val="FFBCBC"/>
+              </a:gs>
+              <a:gs pos="100000">
+                <a:srgbClr val="FFE2E2"/>
+              </a:gs>
+            </a:gsLst>
+            <a:lin ang="16200000" scaled="0"/>
+          </a:gradFill>
+          <a:ln w="19050" cap="flat" cmpd="sng">
+            <a:solidFill>
+              <a:schemeClr val="accent3"/>
+            </a:solidFill>
+            <a:prstDash val="solid"/>
+            <a:round/>
+            <a:headEnd type="none" w="med" len="med"/>
+            <a:tailEnd type="stealth" w="lg" len="lg"/>
+          </a:ln>
+        </p:spPr>
+      </p:cxnSp>
+      <p:sp>
+        <p:nvSpPr>
+          <p:cNvPr id="201" name="Shape 201"/>
+          <p:cNvSpPr/>
+          <p:nvPr/>
+        </p:nvSpPr>
+        <p:spPr>
+          <a:xfrm>
+            <a:off x="3759694" y="3416960"/>
+            <a:ext cx="1040906" cy="236841"/>
+          </a:xfrm>
+          <a:prstGeom prst="rect">
+            <a:avLst/>
+          </a:prstGeom>
+          <a:gradFill>
+            <a:gsLst>
+              <a:gs pos="0">
+                <a:srgbClr val="DAFEA4"/>
+              </a:gs>
+              <a:gs pos="35000">
+                <a:srgbClr val="E3FEBF"/>
+              </a:gs>
+              <a:gs pos="100000">
+                <a:srgbClr val="F4FEE6"/>
+              </a:gs>
+            </a:gsLst>
+            <a:lin ang="16200000" scaled="0"/>
+          </a:gradFill>
+          <a:ln w="19050" cap="flat" cmpd="sng">
+            <a:solidFill>
+              <a:schemeClr val="accent3"/>
+            </a:solidFill>
+            <a:prstDash val="solid"/>
+            <a:round/>
+            <a:headEnd type="none" w="med" len="med"/>
+            <a:tailEnd type="none" w="med" len="med"/>
+          </a:ln>
+        </p:spPr>
+        <p:txBody>
+          <a:bodyPr lIns="91425" tIns="45700" rIns="91425" bIns="45700" anchor="ctr" anchorCtr="0">
+            <a:noAutofit/>
+          </a:bodyPr>
+          <a:lstStyle/>
+          <a:p>
+            <a:pPr marL="0" marR="0" lvl="0" indent="0" algn="ctr" rtl="0">
+              <a:spcBef>
+                <a:spcPts val="0"/>
+              </a:spcBef>
+              <a:buSzPct val="25000"/>
+              <a:buNone/>
+            </a:pPr>
+            <a:r>
+              <a:rPr lang="en-US" sz="1050" b="1">
+                <a:solidFill>
+                  <a:srgbClr val="76923C"/>
+                </a:solidFill>
+                <a:latin typeface="Calibri"/>
+                <a:ea typeface="Calibri"/>
+                <a:cs typeface="Calibri"/>
+                <a:sym typeface="Calibri"/>
+              </a:rPr>
+              <a:t>ResultsDisplay</a:t>
+            </a:r>
+          </a:p>
+        </p:txBody>
+      </p:sp>
+      <p:cxnSp>
+        <p:nvCxnSpPr>
+          <p:cNvPr id="202" name="Shape 202"/>
+          <p:cNvCxnSpPr>
+            <a:stCxn id="199" idx="2"/>
+            <a:endCxn id="194" idx="1"/>
+          </p:cNvCxnSpPr>
+          <p:nvPr/>
+        </p:nvCxnSpPr>
+        <p:spPr>
+          <a:xfrm rot="-5400000" flipH="1">
+            <a:off x="2054476" y="3229674"/>
+            <a:ext cx="899700" cy="176400"/>
+          </a:xfrm>
+          <a:prstGeom prst="bentConnector2">
+            <a:avLst/>
+          </a:prstGeom>
+          <a:gradFill>
+            <a:gsLst>
+              <a:gs pos="0">
+                <a:srgbClr val="FFA09D"/>
+              </a:gs>
+              <a:gs pos="35000">
+                <a:srgbClr val="FFBCBC"/>
+              </a:gs>
+              <a:gs pos="100000">
+                <a:srgbClr val="FFE2E2"/>
+              </a:gs>
+            </a:gsLst>
+            <a:lin ang="16200000" scaled="0"/>
+          </a:gradFill>
+          <a:ln w="19050" cap="flat" cmpd="sng">
+            <a:solidFill>
+              <a:schemeClr val="accent3"/>
+            </a:solidFill>
+            <a:prstDash val="solid"/>
+            <a:round/>
+            <a:headEnd type="none" w="med" len="med"/>
+            <a:tailEnd type="stealth" w="lg" len="lg"/>
+          </a:ln>
+        </p:spPr>
+      </p:cxnSp>
+      <p:cxnSp>
+        <p:nvCxnSpPr>
+          <p:cNvPr id="203" name="Shape 203"/>
+          <p:cNvCxnSpPr>
+            <a:stCxn id="199" idx="2"/>
+            <a:endCxn id="196" idx="1"/>
+          </p:cNvCxnSpPr>
+          <p:nvPr/>
+        </p:nvCxnSpPr>
+        <p:spPr>
+          <a:xfrm rot="-5400000" flipH="1">
+            <a:off x="1883176" y="3400974"/>
+            <a:ext cx="1242300" cy="176400"/>
+          </a:xfrm>
+          <a:prstGeom prst="bentConnector2">
+            <a:avLst/>
+          </a:prstGeom>
+          <a:gradFill>
+            <a:gsLst>
+              <a:gs pos="0">
+                <a:srgbClr val="FFA09D"/>
+              </a:gs>
+              <a:gs pos="35000">
+                <a:srgbClr val="FFBCBC"/>
+              </a:gs>
+              <a:gs pos="100000">
+                <a:srgbClr val="FFE2E2"/>
+              </a:gs>
+            </a:gsLst>
+            <a:lin ang="16200000" scaled="0"/>
+          </a:gradFill>
+          <a:ln w="19050" cap="flat" cmpd="sng">
+            <a:solidFill>
+              <a:schemeClr val="accent3"/>
+            </a:solidFill>
+            <a:prstDash val="solid"/>
+            <a:round/>
+            <a:headEnd type="none" w="med" len="med"/>
+            <a:tailEnd type="stealth" w="lg" len="lg"/>
+          </a:ln>
+        </p:spPr>
+      </p:cxnSp>
+      <p:cxnSp>
+        <p:nvCxnSpPr>
+          <p:cNvPr id="204" name="Shape 204"/>
+          <p:cNvCxnSpPr>
+            <a:stCxn id="199" idx="2"/>
+            <a:endCxn id="195" idx="1"/>
+          </p:cNvCxnSpPr>
+          <p:nvPr/>
+        </p:nvCxnSpPr>
+        <p:spPr>
+          <a:xfrm rot="16200000" flipH="1">
+            <a:off x="1540098" y="3744051"/>
+            <a:ext cx="1928456" cy="176400"/>
+          </a:xfrm>
+          <a:prstGeom prst="bentConnector2">
+            <a:avLst/>
+          </a:prstGeom>
+          <a:gradFill>
+            <a:gsLst>
+              <a:gs pos="0">
+                <a:srgbClr val="FFA09D"/>
+              </a:gs>
+              <a:gs pos="35000">
+                <a:srgbClr val="FFBCBC"/>
+              </a:gs>
+              <a:gs pos="100000">
+                <a:srgbClr val="FFE2E2"/>
+              </a:gs>
+            </a:gsLst>
+            <a:lin ang="16200000" scaled="0"/>
+          </a:gradFill>
+          <a:ln w="19050" cap="flat" cmpd="sng">
+            <a:solidFill>
+              <a:schemeClr val="accent3"/>
+            </a:solidFill>
+            <a:prstDash val="solid"/>
+            <a:round/>
+            <a:headEnd type="none" w="med" len="med"/>
+            <a:tailEnd type="stealth" w="lg" len="lg"/>
+          </a:ln>
+        </p:spPr>
+      </p:cxnSp>
+      <p:cxnSp>
+        <p:nvCxnSpPr>
+          <p:cNvPr id="205" name="Shape 205"/>
+          <p:cNvCxnSpPr>
+            <a:endCxn id="198" idx="1"/>
+          </p:cNvCxnSpPr>
+          <p:nvPr/>
+        </p:nvCxnSpPr>
+        <p:spPr>
+          <a:xfrm rot="-5400000" flipH="1">
+            <a:off x="1184177" y="3744650"/>
+            <a:ext cx="2396400" cy="420300"/>
+          </a:xfrm>
+          <a:prstGeom prst="bentConnector2">
+            <a:avLst/>
+          </a:prstGeom>
+          <a:gradFill>
+            <a:gsLst>
+              <a:gs pos="0">
+                <a:srgbClr val="FFA09D"/>
+              </a:gs>
+              <a:gs pos="35000">
+                <a:srgbClr val="FFBCBC"/>
+              </a:gs>
+              <a:gs pos="100000">
+                <a:srgbClr val="FFE2E2"/>
+              </a:gs>
+            </a:gsLst>
+            <a:lin ang="16200000" scaled="0"/>
+          </a:gradFill>
+          <a:ln w="19050" cap="flat" cmpd="sng">
+            <a:solidFill>
+              <a:schemeClr val="accent3"/>
+            </a:solidFill>
+            <a:prstDash val="solid"/>
+            <a:round/>
+            <a:headEnd type="none" w="med" len="med"/>
+            <a:tailEnd type="stealth" w="lg" len="lg"/>
+          </a:ln>
+        </p:spPr>
+      </p:cxnSp>
+      <p:sp>
+        <p:nvSpPr>
+          <p:cNvPr id="206" name="Shape 206"/>
+          <p:cNvSpPr/>
+          <p:nvPr/>
+        </p:nvSpPr>
+        <p:spPr>
+          <a:xfrm>
+            <a:off x="5143948" y="1770924"/>
+            <a:ext cx="772043" cy="346760"/>
+          </a:xfrm>
+          <a:prstGeom prst="rect">
+            <a:avLst/>
+          </a:prstGeom>
+          <a:gradFill>
+            <a:gsLst>
+              <a:gs pos="0">
+                <a:srgbClr val="DAFEA4"/>
+              </a:gs>
+              <a:gs pos="35000">
+                <a:srgbClr val="E3FEBF"/>
+              </a:gs>
+              <a:gs pos="100000">
+                <a:srgbClr val="F4FEE6"/>
+              </a:gs>
+            </a:gsLst>
+            <a:lin ang="16200000" scaled="0"/>
+          </a:gradFill>
+          <a:ln w="9525" cap="flat" cmpd="sng">
+            <a:solidFill>
+              <a:schemeClr val="accent3"/>
+            </a:solidFill>
+            <a:prstDash val="solid"/>
+            <a:round/>
+            <a:headEnd type="none" w="med" len="med"/>
+            <a:tailEnd type="none" w="med" len="med"/>
+          </a:ln>
+        </p:spPr>
+        <p:txBody>
+          <a:bodyPr lIns="91425" tIns="45700" rIns="91425" bIns="45700" anchor="ctr" anchorCtr="0">
+            <a:noAutofit/>
+          </a:bodyPr>
+          <a:lstStyle/>
+          <a:p>
+            <a:pPr marL="0" marR="0" lvl="0" indent="0" algn="ctr" rtl="0">
+              <a:spcBef>
+                <a:spcPts val="0"/>
+              </a:spcBef>
+              <a:buSzPct val="25000"/>
+              <a:buNone/>
+            </a:pPr>
+            <a:r>
+              <a:rPr lang="en-US" sz="1050" b="1">
+                <a:solidFill>
+                  <a:srgbClr val="76923C"/>
+                </a:solidFill>
+                <a:latin typeface="Calibri"/>
+                <a:ea typeface="Calibri"/>
+                <a:cs typeface="Calibri"/>
+                <a:sym typeface="Calibri"/>
+              </a:rPr>
+              <a:t>{abstract}</a:t>
+            </a:r>
+            <a:br>
+              <a:rPr lang="en-US" sz="1050" b="1">
+                <a:solidFill>
+                  <a:srgbClr val="76923C"/>
+                </a:solidFill>
+                <a:latin typeface="Calibri"/>
+                <a:ea typeface="Calibri"/>
+                <a:cs typeface="Calibri"/>
+                <a:sym typeface="Calibri"/>
+              </a:rPr>
+            </a:br>
+            <a:r>
+              <a:rPr lang="en-US" sz="1050" b="1">
+                <a:solidFill>
+                  <a:srgbClr val="76923C"/>
+                </a:solidFill>
+                <a:latin typeface="Calibri"/>
+                <a:ea typeface="Calibri"/>
+                <a:cs typeface="Calibri"/>
+                <a:sym typeface="Calibri"/>
+              </a:rPr>
+              <a:t>UiPart</a:t>
+            </a:r>
+          </a:p>
+        </p:txBody>
+      </p:sp>
+      <p:cxnSp>
+        <p:nvCxnSpPr>
+          <p:cNvPr id="207" name="Shape 207"/>
+          <p:cNvCxnSpPr>
+            <a:stCxn id="201" idx="3"/>
+            <a:endCxn id="191" idx="3"/>
+          </p:cNvCxnSpPr>
+          <p:nvPr/>
+        </p:nvCxnSpPr>
+        <p:spPr>
+          <a:xfrm rot="10800000" flipH="1">
+            <a:off x="4800600" y="2285881"/>
+            <a:ext cx="729300" cy="1249500"/>
+          </a:xfrm>
+          <a:prstGeom prst="bentConnector2">
+            <a:avLst/>
+          </a:prstGeom>
+          <a:gradFill>
+            <a:gsLst>
+              <a:gs pos="0">
+                <a:srgbClr val="FFA09D"/>
+              </a:gs>
+              <a:gs pos="35000">
+                <a:srgbClr val="FFBCBC"/>
+              </a:gs>
+              <a:gs pos="100000">
+                <a:srgbClr val="FFE2E2"/>
+              </a:gs>
+            </a:gsLst>
+            <a:lin ang="16200000" scaled="0"/>
+          </a:gradFill>
+          <a:ln w="9525" cap="flat" cmpd="sng">
+            <a:solidFill>
+              <a:schemeClr val="accent3"/>
+            </a:solidFill>
+            <a:prstDash val="solid"/>
+            <a:round/>
+            <a:headEnd type="none" w="med" len="med"/>
+            <a:tailEnd type="none" w="med" len="med"/>
+          </a:ln>
+        </p:spPr>
+      </p:cxnSp>
+      <p:cxnSp>
+        <p:nvCxnSpPr>
+          <p:cNvPr id="208" name="Shape 208"/>
+          <p:cNvCxnSpPr>
+            <a:stCxn id="191" idx="3"/>
+            <a:endCxn id="45" idx="3"/>
+          </p:cNvCxnSpPr>
+          <p:nvPr/>
+        </p:nvCxnSpPr>
+        <p:spPr>
+          <a:xfrm rot="5400000">
+            <a:off x="3524423" y="2455355"/>
+            <a:ext cx="2174903" cy="1836189"/>
+          </a:xfrm>
+          <a:prstGeom prst="bentConnector2">
+            <a:avLst/>
+          </a:prstGeom>
+          <a:gradFill>
+            <a:gsLst>
+              <a:gs pos="0">
+                <a:srgbClr val="FFA09D"/>
+              </a:gs>
+              <a:gs pos="35000">
+                <a:srgbClr val="FFBCBC"/>
+              </a:gs>
+              <a:gs pos="100000">
+                <a:srgbClr val="FFE2E2"/>
+              </a:gs>
+            </a:gsLst>
+            <a:lin ang="16200000" scaled="0"/>
+          </a:gradFill>
+          <a:ln w="9525" cap="flat" cmpd="sng">
+            <a:solidFill>
+              <a:schemeClr val="accent3"/>
+            </a:solidFill>
+            <a:prstDash val="solid"/>
+            <a:round/>
+            <a:headEnd type="none" w="med" len="med"/>
+            <a:tailEnd type="none" w="med" len="med"/>
+          </a:ln>
+        </p:spPr>
+      </p:cxnSp>
+      <p:cxnSp>
+        <p:nvCxnSpPr>
+          <p:cNvPr id="209" name="Shape 209"/>
+          <p:cNvCxnSpPr>
+            <a:stCxn id="191" idx="3"/>
+            <a:endCxn id="194" idx="3"/>
+          </p:cNvCxnSpPr>
+          <p:nvPr/>
+        </p:nvCxnSpPr>
+        <p:spPr>
+          <a:xfrm rot="5400000">
+            <a:off x="3867219" y="2104949"/>
+            <a:ext cx="1481700" cy="1843800"/>
+          </a:xfrm>
+          <a:prstGeom prst="bentConnector2">
+            <a:avLst/>
+          </a:prstGeom>
+          <a:gradFill>
+            <a:gsLst>
+              <a:gs pos="0">
+                <a:srgbClr val="FFA09D"/>
+              </a:gs>
+              <a:gs pos="35000">
+                <a:srgbClr val="FFBCBC"/>
+              </a:gs>
+              <a:gs pos="100000">
+                <a:srgbClr val="FFE2E2"/>
+              </a:gs>
+            </a:gsLst>
+            <a:lin ang="16200000" scaled="0"/>
+          </a:gradFill>
+          <a:ln w="9525" cap="flat" cmpd="sng">
+            <a:solidFill>
+              <a:schemeClr val="accent3"/>
+            </a:solidFill>
+            <a:prstDash val="solid"/>
+            <a:round/>
+            <a:headEnd type="none" w="med" len="med"/>
+            <a:tailEnd type="none" w="med" len="med"/>
+          </a:ln>
+        </p:spPr>
+      </p:cxnSp>
+      <p:cxnSp>
+        <p:nvCxnSpPr>
+          <p:cNvPr id="210" name="Shape 210"/>
+          <p:cNvCxnSpPr>
+            <a:stCxn id="187" idx="3"/>
+            <a:endCxn id="191" idx="3"/>
+          </p:cNvCxnSpPr>
+          <p:nvPr/>
+        </p:nvCxnSpPr>
+        <p:spPr>
+          <a:xfrm rot="10800000" flipH="1">
+            <a:off x="3189583" y="2285999"/>
+            <a:ext cx="2340300" cy="228600"/>
+          </a:xfrm>
+          <a:prstGeom prst="bentConnector2">
+            <a:avLst/>
+          </a:prstGeom>
+          <a:gradFill>
+            <a:gsLst>
+              <a:gs pos="0">
+                <a:srgbClr val="FFA09D"/>
+              </a:gs>
+              <a:gs pos="35000">
+                <a:srgbClr val="FFBCBC"/>
+              </a:gs>
+              <a:gs pos="100000">
+                <a:srgbClr val="FFE2E2"/>
+              </a:gs>
+            </a:gsLst>
+            <a:lin ang="16200000" scaled="0"/>
+          </a:gradFill>
+          <a:ln w="9525" cap="flat" cmpd="sng">
+            <a:solidFill>
+              <a:schemeClr val="accent3"/>
+            </a:solidFill>
+            <a:prstDash val="solid"/>
+            <a:round/>
+            <a:headEnd type="none" w="med" len="med"/>
+            <a:tailEnd type="none" w="med" len="med"/>
+          </a:ln>
+        </p:spPr>
+      </p:cxnSp>
+      <p:cxnSp>
+        <p:nvCxnSpPr>
+          <p:cNvPr id="211" name="Shape 211"/>
+          <p:cNvCxnSpPr>
+            <a:stCxn id="191" idx="3"/>
+            <a:endCxn id="195" idx="3"/>
+          </p:cNvCxnSpPr>
+          <p:nvPr/>
+        </p:nvCxnSpPr>
+        <p:spPr>
+          <a:xfrm rot="5400000">
+            <a:off x="3352824" y="2619334"/>
+            <a:ext cx="2510481" cy="1843808"/>
+          </a:xfrm>
+          <a:prstGeom prst="bentConnector2">
+            <a:avLst/>
+          </a:prstGeom>
+          <a:gradFill>
+            <a:gsLst>
+              <a:gs pos="0">
+                <a:srgbClr val="FFA09D"/>
+              </a:gs>
+              <a:gs pos="35000">
+                <a:srgbClr val="FFBCBC"/>
+              </a:gs>
+              <a:gs pos="100000">
+                <a:srgbClr val="FFE2E2"/>
+              </a:gs>
+            </a:gsLst>
+            <a:lin ang="16200000" scaled="0"/>
+          </a:gradFill>
+          <a:ln w="9525" cap="flat" cmpd="sng">
+            <a:solidFill>
+              <a:schemeClr val="accent3"/>
+            </a:solidFill>
+            <a:prstDash val="solid"/>
+            <a:round/>
+            <a:headEnd type="none" w="med" len="med"/>
+            <a:tailEnd type="none" w="med" len="med"/>
+          </a:ln>
+        </p:spPr>
+      </p:cxnSp>
+      <p:cxnSp>
+        <p:nvCxnSpPr>
+          <p:cNvPr id="212" name="Shape 212"/>
+          <p:cNvCxnSpPr>
+            <a:stCxn id="191" idx="3"/>
+            <a:endCxn id="198" idx="3"/>
+          </p:cNvCxnSpPr>
+          <p:nvPr/>
+        </p:nvCxnSpPr>
+        <p:spPr>
+          <a:xfrm rot="5400000">
+            <a:off x="3174564" y="2797596"/>
+            <a:ext cx="2867003" cy="1843807"/>
+          </a:xfrm>
+          <a:prstGeom prst="bentConnector2">
+            <a:avLst/>
+          </a:prstGeom>
+          <a:gradFill>
+            <a:gsLst>
+              <a:gs pos="0">
+                <a:srgbClr val="FFA09D"/>
+              </a:gs>
+              <a:gs pos="35000">
+                <a:srgbClr val="FFBCBC"/>
+              </a:gs>
+              <a:gs pos="100000">
+                <a:srgbClr val="FFE2E2"/>
+              </a:gs>
+            </a:gsLst>
+            <a:lin ang="16200000" scaled="0"/>
+          </a:gradFill>
+          <a:ln w="9525" cap="flat" cmpd="sng">
+            <a:solidFill>
+              <a:schemeClr val="accent3"/>
+            </a:solidFill>
+            <a:prstDash val="solid"/>
+            <a:round/>
+            <a:headEnd type="none" w="med" len="med"/>
+            <a:tailEnd type="none" w="med" len="med"/>
+          </a:ln>
+        </p:spPr>
+      </p:cxnSp>
+      <p:sp>
+        <p:nvSpPr>
+          <p:cNvPr id="213" name="Shape 213"/>
+          <p:cNvSpPr/>
+          <p:nvPr/>
+        </p:nvSpPr>
+        <p:spPr>
+          <a:xfrm>
+            <a:off x="3657600" y="1770924"/>
+            <a:ext cx="1031399" cy="346760"/>
+          </a:xfrm>
+          <a:prstGeom prst="rect">
+            <a:avLst/>
+          </a:prstGeom>
+          <a:solidFill>
+            <a:srgbClr val="00B050"/>
+          </a:solidFill>
+          <a:ln w="19050" cap="flat" cmpd="sng">
+            <a:solidFill>
+              <a:srgbClr val="00B050"/>
+            </a:solidFill>
+            <a:prstDash val="solid"/>
+            <a:round/>
+            <a:headEnd type="none" w="med" len="med"/>
+            <a:tailEnd type="none" w="med" len="med"/>
+          </a:ln>
+        </p:spPr>
+        <p:txBody>
+          <a:bodyPr lIns="91425" tIns="45700" rIns="91425" bIns="45700" anchor="ctr" anchorCtr="0">
+            <a:noAutofit/>
+          </a:bodyPr>
+          <a:lstStyle/>
+          <a:p>
+            <a:pPr marL="0" marR="0" lvl="0" indent="0" algn="ctr" rtl="0">
+              <a:spcBef>
+                <a:spcPts val="0"/>
+              </a:spcBef>
+              <a:buSzPct val="25000"/>
+              <a:buNone/>
+            </a:pPr>
+            <a:r>
+              <a:rPr lang="en-US" sz="1050">
+                <a:solidFill>
+                  <a:schemeClr val="lt1"/>
+                </a:solidFill>
+                <a:latin typeface="Calibri"/>
+                <a:ea typeface="Calibri"/>
+                <a:cs typeface="Calibri"/>
+                <a:sym typeface="Calibri"/>
+              </a:rPr>
+              <a:t>UiPartLoader</a:t>
+            </a:r>
+          </a:p>
+        </p:txBody>
+      </p:sp>
+      <p:cxnSp>
+        <p:nvCxnSpPr>
+          <p:cNvPr id="214" name="Shape 214"/>
+          <p:cNvCxnSpPr>
+            <a:stCxn id="189" idx="0"/>
+          </p:cNvCxnSpPr>
+          <p:nvPr/>
+        </p:nvCxnSpPr>
+        <p:spPr>
+          <a:xfrm rot="-5400000">
+            <a:off x="4594909" y="-355025"/>
+            <a:ext cx="170700" cy="4081200"/>
+          </a:xfrm>
+          <a:prstGeom prst="bentConnector2">
+            <a:avLst/>
+          </a:prstGeom>
+          <a:gradFill>
+            <a:gsLst>
+              <a:gs pos="0">
+                <a:srgbClr val="FFA09D"/>
+              </a:gs>
+              <a:gs pos="35000">
+                <a:srgbClr val="FFBCBC"/>
+              </a:gs>
+              <a:gs pos="100000">
+                <a:srgbClr val="FFE2E2"/>
+              </a:gs>
+            </a:gsLst>
+            <a:lin ang="16200000" scaled="0"/>
+          </a:gradFill>
+          <a:ln w="19050" cap="flat" cmpd="sng">
+            <a:solidFill>
+              <a:srgbClr val="00B050"/>
+            </a:solidFill>
+            <a:prstDash val="solid"/>
+            <a:round/>
+            <a:headEnd type="none" w="med" len="med"/>
+            <a:tailEnd type="stealth" w="lg" len="lg"/>
+          </a:ln>
+        </p:spPr>
+      </p:cxnSp>
+      <p:cxnSp>
+        <p:nvCxnSpPr>
+          <p:cNvPr id="215" name="Shape 215"/>
+          <p:cNvCxnSpPr/>
+          <p:nvPr/>
+        </p:nvCxnSpPr>
+        <p:spPr>
+          <a:xfrm rot="10800000" flipH="1">
+            <a:off x="3198608" y="1944303"/>
+            <a:ext cx="484447" cy="2307"/>
+          </a:xfrm>
+          <a:prstGeom prst="straightConnector1">
+            <a:avLst/>
+          </a:prstGeom>
+          <a:gradFill>
+            <a:gsLst>
+              <a:gs pos="0">
+                <a:srgbClr val="FFA09D"/>
+              </a:gs>
+              <a:gs pos="35000">
+                <a:srgbClr val="FFBCBC"/>
+              </a:gs>
+              <a:gs pos="100000">
+                <a:srgbClr val="FFE2E2"/>
+              </a:gs>
+            </a:gsLst>
+            <a:lin ang="16200000" scaled="0"/>
+          </a:gradFill>
+          <a:ln w="19050" cap="flat" cmpd="sng">
+            <a:solidFill>
+              <a:srgbClr val="00B050"/>
+            </a:solidFill>
+            <a:prstDash val="solid"/>
+            <a:round/>
+            <a:headEnd type="none" w="med" len="med"/>
+            <a:tailEnd type="stealth" w="lg" len="lg"/>
+          </a:ln>
+        </p:spPr>
+      </p:cxnSp>
+      <p:cxnSp>
+        <p:nvCxnSpPr>
+          <p:cNvPr id="216" name="Shape 216"/>
+          <p:cNvCxnSpPr>
+            <a:endCxn id="206" idx="1"/>
+          </p:cNvCxnSpPr>
+          <p:nvPr/>
+        </p:nvCxnSpPr>
+        <p:spPr>
+          <a:xfrm rot="10800000" flipH="1">
+            <a:off x="4714348" y="1944304"/>
+            <a:ext cx="429600" cy="2400"/>
+          </a:xfrm>
+          <a:prstGeom prst="straightConnector1">
+            <a:avLst/>
+          </a:prstGeom>
+          <a:gradFill>
+            <a:gsLst>
+              <a:gs pos="0">
+                <a:srgbClr val="FFA09D"/>
+              </a:gs>
+              <a:gs pos="35000">
+                <a:srgbClr val="FFBCBC"/>
+              </a:gs>
+              <a:gs pos="100000">
+                <a:srgbClr val="FFE2E2"/>
+              </a:gs>
+            </a:gsLst>
+            <a:lin ang="16200000" scaled="0"/>
+          </a:gradFill>
+          <a:ln w="19050" cap="flat" cmpd="sng">
+            <a:solidFill>
+              <a:schemeClr val="accent3"/>
+            </a:solidFill>
+            <a:prstDash val="dot"/>
+            <a:round/>
+            <a:headEnd type="none" w="med" len="med"/>
+            <a:tailEnd type="stealth" w="lg" len="lg"/>
+          </a:ln>
+        </p:spPr>
+      </p:cxnSp>
+      <p:sp>
+        <p:nvSpPr>
+          <p:cNvPr id="217" name="Shape 217"/>
+          <p:cNvSpPr/>
+          <p:nvPr/>
+        </p:nvSpPr>
+        <p:spPr>
+          <a:xfrm rot="-5400000">
+            <a:off x="6213738" y="4560376"/>
+            <a:ext cx="1371598" cy="328045"/>
+          </a:xfrm>
+          <a:prstGeom prst="roundRect">
+            <a:avLst>
+              <a:gd name="adj" fmla="val 16667"/>
+            </a:avLst>
+          </a:prstGeom>
+          <a:solidFill>
+            <a:srgbClr val="E5DFEC"/>
+          </a:solidFill>
+          <a:ln>
+            <a:noFill/>
+          </a:ln>
+        </p:spPr>
+        <p:txBody>
+          <a:bodyPr lIns="91425" tIns="45700" rIns="91425" bIns="45700" anchor="ctr" anchorCtr="0">
+            <a:noAutofit/>
+          </a:bodyPr>
+          <a:lstStyle/>
+          <a:p>
+            <a:pPr marL="0" marR="0" lvl="0" indent="0" algn="ctr" rtl="0">
+              <a:spcBef>
+                <a:spcPts val="0"/>
+              </a:spcBef>
+              <a:buSzPct val="25000"/>
+              <a:buNone/>
+            </a:pPr>
+            <a:r>
+              <a:rPr lang="en-US" sz="1100" b="1">
+                <a:solidFill>
+                  <a:schemeClr val="lt1"/>
+                </a:solidFill>
+                <a:latin typeface="Calibri"/>
+                <a:ea typeface="Calibri"/>
+                <a:cs typeface="Calibri"/>
+                <a:sym typeface="Calibri"/>
+              </a:rPr>
+              <a:t>Model</a:t>
+            </a:r>
+          </a:p>
+        </p:txBody>
+      </p:sp>
+      <p:sp>
+        <p:nvSpPr>
+          <p:cNvPr id="218" name="Shape 218"/>
+          <p:cNvSpPr/>
+          <p:nvPr/>
+        </p:nvSpPr>
+        <p:spPr>
+          <a:xfrm rot="-5400000">
+            <a:off x="956201" y="2861202"/>
+            <a:ext cx="1093634" cy="346760"/>
+          </a:xfrm>
+          <a:prstGeom prst="rect">
+            <a:avLst/>
+          </a:prstGeom>
+          <a:solidFill>
+            <a:srgbClr val="00B050"/>
+          </a:solidFill>
+          <a:ln w="19050" cap="flat" cmpd="sng">
+            <a:solidFill>
+              <a:srgbClr val="00B050"/>
+            </a:solidFill>
+            <a:prstDash val="solid"/>
+            <a:round/>
+            <a:headEnd type="none" w="med" len="med"/>
+            <a:tailEnd type="none" w="med" len="med"/>
+          </a:ln>
+        </p:spPr>
+        <p:txBody>
+          <a:bodyPr lIns="91425" tIns="45700" rIns="91425" bIns="45700" anchor="ctr" anchorCtr="0">
+            <a:noAutofit/>
+          </a:bodyPr>
+          <a:lstStyle/>
+          <a:p>
+            <a:pPr marL="0" marR="0" lvl="0" indent="0" algn="ctr" rtl="0">
+              <a:spcBef>
+                <a:spcPts val="0"/>
+              </a:spcBef>
+              <a:buSzPct val="25000"/>
+              <a:buNone/>
+            </a:pPr>
+            <a:r>
+              <a:rPr lang="en-US" sz="1050">
+                <a:solidFill>
+                  <a:schemeClr val="lt1"/>
+                </a:solidFill>
+                <a:latin typeface="Calibri"/>
+                <a:ea typeface="Calibri"/>
+                <a:cs typeface="Calibri"/>
+                <a:sym typeface="Calibri"/>
+              </a:rPr>
+              <a:t>&lt;&lt;interface&gt;&gt;</a:t>
+            </a:r>
+          </a:p>
+          <a:p>
+            <a:pPr marL="0" marR="0" lvl="0" indent="0" algn="ctr" rtl="0">
+              <a:spcBef>
+                <a:spcPts val="0"/>
+              </a:spcBef>
+              <a:buSzPct val="25000"/>
+              <a:buNone/>
+            </a:pPr>
+            <a:r>
+              <a:rPr lang="en-US" sz="1050">
+                <a:solidFill>
+                  <a:schemeClr val="lt1"/>
+                </a:solidFill>
+                <a:latin typeface="Calibri"/>
+                <a:ea typeface="Calibri"/>
+                <a:cs typeface="Calibri"/>
+                <a:sym typeface="Calibri"/>
+              </a:rPr>
+              <a:t>Ui</a:t>
+            </a:r>
+          </a:p>
+        </p:txBody>
+      </p:sp>
+      <p:sp>
+        <p:nvSpPr>
+          <p:cNvPr id="219" name="Shape 219"/>
+          <p:cNvSpPr/>
+          <p:nvPr/>
+        </p:nvSpPr>
+        <p:spPr>
+          <a:xfrm rot="10800000" flipH="1">
+            <a:off x="1367766" y="2286001"/>
+            <a:ext cx="270503" cy="175522"/>
+          </a:xfrm>
+          <a:prstGeom prst="triangle">
+            <a:avLst>
+              <a:gd name="adj" fmla="val 50000"/>
+            </a:avLst>
+          </a:prstGeom>
+          <a:gradFill>
+            <a:gsLst>
+              <a:gs pos="0">
+                <a:srgbClr val="DAFEA4"/>
+              </a:gs>
+              <a:gs pos="35000">
+                <a:srgbClr val="E3FEBF"/>
+              </a:gs>
+              <a:gs pos="100000">
+                <a:srgbClr val="F4FEE6"/>
+              </a:gs>
+            </a:gsLst>
+            <a:lin ang="16200000" scaled="0"/>
+          </a:gradFill>
+          <a:ln w="19050" cap="flat" cmpd="sng">
+            <a:solidFill>
+              <a:srgbClr val="00B050"/>
+            </a:solidFill>
+            <a:prstDash val="solid"/>
+            <a:round/>
+            <a:headEnd type="none" w="med" len="med"/>
+            <a:tailEnd type="none" w="med" len="med"/>
+          </a:ln>
+        </p:spPr>
+        <p:txBody>
+          <a:bodyPr lIns="91425" tIns="45700" rIns="91425" bIns="45700" anchor="ctr" anchorCtr="0">
+            <a:noAutofit/>
+          </a:bodyPr>
+          <a:lstStyle/>
+          <a:p>
+            <a:pPr marL="0" marR="0" lvl="0" indent="0" algn="ctr" rtl="0">
+              <a:spcBef>
+                <a:spcPts val="0"/>
+              </a:spcBef>
+              <a:buNone/>
+            </a:pPr>
+            <a:endParaRPr sz="1050" b="1">
+              <a:solidFill>
+                <a:srgbClr val="92D050"/>
+              </a:solidFill>
+              <a:latin typeface="Calibri"/>
+              <a:ea typeface="Calibri"/>
+              <a:cs typeface="Calibri"/>
+              <a:sym typeface="Calibri"/>
+            </a:endParaRPr>
+          </a:p>
+        </p:txBody>
+      </p:sp>
+      <p:cxnSp>
+        <p:nvCxnSpPr>
+          <p:cNvPr id="220" name="Shape 220"/>
+          <p:cNvCxnSpPr>
+            <a:stCxn id="189" idx="1"/>
+            <a:endCxn id="219" idx="3"/>
+          </p:cNvCxnSpPr>
+          <p:nvPr/>
+        </p:nvCxnSpPr>
+        <p:spPr>
+          <a:xfrm flipH="1">
+            <a:off x="1503041" y="1944304"/>
+            <a:ext cx="589800" cy="341700"/>
+          </a:xfrm>
+          <a:prstGeom prst="bentConnector2">
+            <a:avLst/>
+          </a:prstGeom>
+          <a:gradFill>
+            <a:gsLst>
+              <a:gs pos="0">
+                <a:srgbClr val="FFA09D"/>
+              </a:gs>
+              <a:gs pos="35000">
+                <a:srgbClr val="FFBCBC"/>
+              </a:gs>
+              <a:gs pos="100000">
+                <a:srgbClr val="FFE2E2"/>
+              </a:gs>
+            </a:gsLst>
+            <a:lin ang="16200000" scaled="0"/>
+          </a:gradFill>
+          <a:ln w="19050" cap="flat" cmpd="sng">
+            <a:solidFill>
+              <a:srgbClr val="00B050"/>
+            </a:solidFill>
+            <a:prstDash val="dot"/>
+            <a:round/>
+            <a:headEnd type="none" w="med" len="med"/>
+            <a:tailEnd type="none" w="med" len="med"/>
+          </a:ln>
+        </p:spPr>
+      </p:cxnSp>
+      <p:cxnSp>
+        <p:nvCxnSpPr>
+          <p:cNvPr id="221" name="Shape 221"/>
+          <p:cNvCxnSpPr>
+            <a:stCxn id="188" idx="2"/>
+            <a:endCxn id="201" idx="1"/>
+          </p:cNvCxnSpPr>
+          <p:nvPr/>
+        </p:nvCxnSpPr>
+        <p:spPr>
+          <a:xfrm rot="-5400000" flipH="1">
+            <a:off x="3389845" y="3165500"/>
+            <a:ext cx="119400" cy="620400"/>
+          </a:xfrm>
+          <a:prstGeom prst="bentConnector2">
+            <a:avLst/>
+          </a:prstGeom>
+          <a:gradFill>
+            <a:gsLst>
+              <a:gs pos="0">
+                <a:srgbClr val="FFA09D"/>
+              </a:gs>
+              <a:gs pos="35000">
+                <a:srgbClr val="FFBCBC"/>
+              </a:gs>
+              <a:gs pos="100000">
+                <a:srgbClr val="FFE2E2"/>
+              </a:gs>
+            </a:gsLst>
+            <a:lin ang="16200000" scaled="0"/>
+          </a:gradFill>
+          <a:ln w="19050" cap="flat" cmpd="sng">
+            <a:solidFill>
+              <a:schemeClr val="accent3"/>
+            </a:solidFill>
+            <a:prstDash val="solid"/>
+            <a:round/>
+            <a:headEnd type="none" w="med" len="med"/>
+            <a:tailEnd type="stealth" w="lg" len="lg"/>
+          </a:ln>
+        </p:spPr>
+      </p:cxnSp>
+      <p:cxnSp>
+        <p:nvCxnSpPr>
+          <p:cNvPr id="222" name="Shape 222"/>
+          <p:cNvCxnSpPr>
+            <a:stCxn id="191" idx="3"/>
+            <a:endCxn id="188" idx="3"/>
+          </p:cNvCxnSpPr>
+          <p:nvPr/>
+        </p:nvCxnSpPr>
+        <p:spPr>
+          <a:xfrm rot="5400000">
+            <a:off x="4102269" y="1869899"/>
+            <a:ext cx="1011600" cy="1843800"/>
+          </a:xfrm>
+          <a:prstGeom prst="bentConnector2">
+            <a:avLst/>
+          </a:prstGeom>
+          <a:gradFill>
+            <a:gsLst>
+              <a:gs pos="0">
+                <a:srgbClr val="FFA09D"/>
+              </a:gs>
+              <a:gs pos="35000">
+                <a:srgbClr val="FFBCBC"/>
+              </a:gs>
+              <a:gs pos="100000">
+                <a:srgbClr val="FFE2E2"/>
+              </a:gs>
+            </a:gsLst>
+            <a:lin ang="16200000" scaled="0"/>
+          </a:gradFill>
+          <a:ln w="9525" cap="flat" cmpd="sng">
+            <a:solidFill>
+              <a:schemeClr val="accent3"/>
+            </a:solidFill>
+            <a:prstDash val="solid"/>
+            <a:round/>
+            <a:headEnd type="none" w="med" len="med"/>
+            <a:tailEnd type="none" w="med" len="med"/>
+          </a:ln>
+        </p:spPr>
+      </p:cxnSp>
+      <p:cxnSp>
+        <p:nvCxnSpPr>
+          <p:cNvPr id="224" name="Shape 224"/>
+          <p:cNvCxnSpPr>
+            <a:stCxn id="191" idx="3"/>
+            <a:endCxn id="196" idx="3"/>
+          </p:cNvCxnSpPr>
+          <p:nvPr/>
+        </p:nvCxnSpPr>
+        <p:spPr>
+          <a:xfrm rot="5400000">
+            <a:off x="3695919" y="2276249"/>
+            <a:ext cx="1824300" cy="1843800"/>
+          </a:xfrm>
+          <a:prstGeom prst="bentConnector2">
+            <a:avLst/>
+          </a:prstGeom>
+          <a:gradFill>
+            <a:gsLst>
+              <a:gs pos="0">
+                <a:srgbClr val="FFA09D"/>
+              </a:gs>
+              <a:gs pos="35000">
+                <a:srgbClr val="FFBCBC"/>
+              </a:gs>
+              <a:gs pos="100000">
+                <a:srgbClr val="FFE2E2"/>
+              </a:gs>
+            </a:gsLst>
+            <a:lin ang="16200000" scaled="0"/>
+          </a:gradFill>
+          <a:ln w="9525" cap="flat" cmpd="sng">
+            <a:solidFill>
+              <a:schemeClr val="accent3"/>
+            </a:solidFill>
+            <a:prstDash val="solid"/>
+            <a:round/>
+            <a:headEnd type="none" w="med" len="med"/>
+            <a:tailEnd type="none" w="med" len="med"/>
+          </a:ln>
+        </p:spPr>
+      </p:cxnSp>
+      <p:sp>
+        <p:nvSpPr>
+          <p:cNvPr id="225" name="Shape 225"/>
+          <p:cNvSpPr/>
+          <p:nvPr/>
+        </p:nvSpPr>
+        <p:spPr>
+          <a:xfrm>
+            <a:off x="5435896" y="2895600"/>
+            <a:ext cx="229325" cy="166560"/>
+          </a:xfrm>
+          <a:prstGeom prst="rect">
+            <a:avLst/>
+          </a:prstGeom>
+          <a:solidFill>
+            <a:srgbClr val="EAF1DD">
+              <a:alpha val="80000"/>
+            </a:srgbClr>
+          </a:solidFill>
+          <a:ln>
+            <a:noFill/>
+          </a:ln>
+        </p:spPr>
+        <p:txBody>
+          <a:bodyPr lIns="91425" tIns="45700" rIns="91425" bIns="45700" anchor="ctr" anchorCtr="0">
+            <a:noAutofit/>
+          </a:bodyPr>
+          <a:lstStyle/>
+          <a:p>
+            <a:pPr marL="0" marR="0" lvl="0" indent="0" algn="ctr" rtl="0">
+              <a:spcBef>
+                <a:spcPts val="0"/>
+              </a:spcBef>
+              <a:buNone/>
+            </a:pPr>
+            <a:endParaRPr sz="1800">
+              <a:solidFill>
+                <a:schemeClr val="lt1"/>
+              </a:solidFill>
+              <a:latin typeface="Calibri"/>
+              <a:ea typeface="Calibri"/>
+              <a:cs typeface="Calibri"/>
+              <a:sym typeface="Calibri"/>
+            </a:endParaRPr>
+          </a:p>
+        </p:txBody>
+      </p:sp>
+      <p:sp>
+        <p:nvSpPr>
+          <p:cNvPr id="226" name="Shape 226"/>
+          <p:cNvSpPr/>
+          <p:nvPr/>
+        </p:nvSpPr>
+        <p:spPr>
+          <a:xfrm>
+            <a:off x="3687514" y="2981201"/>
+            <a:ext cx="3048000" cy="203199"/>
+          </a:xfrm>
+          <a:custGeom>
+            <a:avLst/>
+            <a:gdLst/>
+            <a:ahLst/>
+            <a:cxnLst/>
+            <a:rect l="0" t="0" r="0" b="0"/>
+            <a:pathLst>
+              <a:path w="120000" h="120000" extrusionOk="0">
+                <a:moveTo>
+                  <a:pt x="0" y="119999"/>
+                </a:moveTo>
+                <a:lnTo>
+                  <a:pt x="8727" y="0"/>
+                </a:lnTo>
+                <a:lnTo>
+                  <a:pt x="120000" y="0"/>
+                </a:lnTo>
+              </a:path>
+            </a:pathLst>
+          </a:custGeom>
+          <a:noFill/>
+          <a:ln w="19050" cap="flat" cmpd="sng">
+            <a:solidFill>
+              <a:schemeClr val="accent3"/>
+            </a:solidFill>
+            <a:prstDash val="solid"/>
+            <a:round/>
+            <a:headEnd type="none" w="med" len="med"/>
+            <a:tailEnd type="stealth" w="lg" len="lg"/>
+          </a:ln>
+        </p:spPr>
+        <p:txBody>
+          <a:bodyPr lIns="91425" tIns="45700" rIns="91425" bIns="45700" anchor="ctr" anchorCtr="0">
+            <a:noAutofit/>
+          </a:bodyPr>
+          <a:lstStyle/>
+          <a:p>
+            <a:pPr marL="0" marR="0" lvl="0" indent="0" algn="ctr" rtl="0">
+              <a:spcBef>
+                <a:spcPts val="0"/>
+              </a:spcBef>
+              <a:buNone/>
+            </a:pPr>
+            <a:endParaRPr sz="1800">
+              <a:solidFill>
+                <a:schemeClr val="dk1"/>
+              </a:solidFill>
+              <a:latin typeface="Calibri"/>
+              <a:ea typeface="Calibri"/>
+              <a:cs typeface="Calibri"/>
+              <a:sym typeface="Calibri"/>
+            </a:endParaRPr>
+          </a:p>
+        </p:txBody>
+      </p:sp>
+      <p:sp>
+        <p:nvSpPr>
+          <p:cNvPr id="227" name="Shape 227"/>
+          <p:cNvSpPr/>
+          <p:nvPr/>
+        </p:nvSpPr>
+        <p:spPr>
+          <a:xfrm>
+            <a:off x="5431573" y="4488137"/>
+            <a:ext cx="229325" cy="160061"/>
+          </a:xfrm>
+          <a:prstGeom prst="rect">
+            <a:avLst/>
+          </a:prstGeom>
+          <a:solidFill>
+            <a:srgbClr val="EAF1DD">
+              <a:alpha val="80000"/>
+            </a:srgbClr>
+          </a:solidFill>
+          <a:ln>
+            <a:noFill/>
+          </a:ln>
+        </p:spPr>
+        <p:txBody>
+          <a:bodyPr lIns="91425" tIns="45700" rIns="91425" bIns="45700" anchor="ctr" anchorCtr="0">
+            <a:noAutofit/>
+          </a:bodyPr>
+          <a:lstStyle/>
+          <a:p>
+            <a:pPr marL="0" marR="0" lvl="0" indent="0" algn="ctr" rtl="0">
+              <a:spcBef>
+                <a:spcPts val="0"/>
+              </a:spcBef>
+              <a:buNone/>
+            </a:pPr>
+            <a:endParaRPr sz="1800">
+              <a:solidFill>
+                <a:schemeClr val="lt1"/>
+              </a:solidFill>
+              <a:latin typeface="Calibri"/>
+              <a:ea typeface="Calibri"/>
+              <a:cs typeface="Calibri"/>
+              <a:sym typeface="Calibri"/>
+            </a:endParaRPr>
+          </a:p>
+        </p:txBody>
+      </p:sp>
+      <p:sp>
+        <p:nvSpPr>
+          <p:cNvPr id="228" name="Shape 228"/>
+          <p:cNvSpPr/>
+          <p:nvPr/>
+        </p:nvSpPr>
+        <p:spPr>
+          <a:xfrm rot="10800000" flipH="1">
+            <a:off x="3695700" y="4114800"/>
+            <a:ext cx="3061292" cy="459506"/>
+          </a:xfrm>
+          <a:custGeom>
+            <a:avLst/>
+            <a:gdLst/>
+            <a:ahLst/>
+            <a:cxnLst/>
+            <a:rect l="0" t="0" r="0" b="0"/>
+            <a:pathLst>
+              <a:path w="120000" h="120000" extrusionOk="0">
+                <a:moveTo>
+                  <a:pt x="0" y="119999"/>
+                </a:moveTo>
+                <a:lnTo>
+                  <a:pt x="8727" y="0"/>
+                </a:lnTo>
+                <a:lnTo>
+                  <a:pt x="120000" y="0"/>
+                </a:lnTo>
+              </a:path>
+            </a:pathLst>
+          </a:custGeom>
+          <a:noFill/>
+          <a:ln w="19050" cap="flat" cmpd="sng">
+            <a:solidFill>
+              <a:schemeClr val="accent3"/>
+            </a:solidFill>
+            <a:prstDash val="dot"/>
+            <a:round/>
+            <a:headEnd type="none" w="med" len="med"/>
+            <a:tailEnd type="stealth" w="lg" len="lg"/>
+          </a:ln>
+        </p:spPr>
+        <p:txBody>
+          <a:bodyPr lIns="91425" tIns="45700" rIns="91425" bIns="45700" anchor="ctr" anchorCtr="0">
+            <a:noAutofit/>
+          </a:bodyPr>
+          <a:lstStyle/>
+          <a:p>
+            <a:pPr marL="0" marR="0" lvl="0" indent="0" algn="ctr" rtl="0">
+              <a:spcBef>
+                <a:spcPts val="0"/>
+              </a:spcBef>
+              <a:buNone/>
+            </a:pPr>
+            <a:endParaRPr sz="1800">
+              <a:solidFill>
+                <a:schemeClr val="dk1"/>
+              </a:solidFill>
+              <a:latin typeface="Calibri"/>
+              <a:ea typeface="Calibri"/>
+              <a:cs typeface="Calibri"/>
+              <a:sym typeface="Calibri"/>
+            </a:endParaRPr>
+          </a:p>
+        </p:txBody>
+      </p:sp>
+      <p:sp>
+        <p:nvSpPr>
+          <p:cNvPr id="45" name="Shape 196"/>
+          <p:cNvSpPr/>
+          <p:nvPr/>
+        </p:nvSpPr>
+        <p:spPr>
+          <a:xfrm>
+            <a:off x="2600145" y="4342480"/>
+            <a:ext cx="1093634" cy="236841"/>
+          </a:xfrm>
+          <a:prstGeom prst="rect">
+            <a:avLst/>
+          </a:prstGeom>
+          <a:gradFill>
+            <a:gsLst>
+              <a:gs pos="0">
+                <a:srgbClr val="DAFEA4"/>
+              </a:gs>
+              <a:gs pos="35000">
+                <a:srgbClr val="E3FEBF"/>
+              </a:gs>
+              <a:gs pos="100000">
+                <a:srgbClr val="F4FEE6"/>
+              </a:gs>
+            </a:gsLst>
+            <a:lin ang="16200000" scaled="0"/>
+          </a:gradFill>
+          <a:ln w="19050" cap="flat" cmpd="sng">
+            <a:solidFill>
+              <a:schemeClr val="accent3"/>
+            </a:solidFill>
+            <a:prstDash val="solid"/>
+            <a:round/>
+            <a:headEnd type="none" w="med" len="med"/>
+            <a:tailEnd type="none" w="med" len="med"/>
+          </a:ln>
+        </p:spPr>
+        <p:txBody>
+          <a:bodyPr lIns="91425" tIns="45700" rIns="91425" bIns="45700" anchor="ctr" anchorCtr="0">
+            <a:noAutofit/>
+          </a:bodyPr>
+          <a:lstStyle/>
+          <a:p>
+            <a:pPr marL="0" marR="0" lvl="0" indent="0" algn="ctr" rtl="0">
+              <a:spcBef>
+                <a:spcPts val="0"/>
+              </a:spcBef>
+              <a:buSzPct val="25000"/>
+              <a:buNone/>
+            </a:pPr>
+            <a:r>
+              <a:rPr lang="en-US" sz="1050" b="1" dirty="0" err="1" smtClean="0">
+                <a:solidFill>
+                  <a:srgbClr val="76923C"/>
+                </a:solidFill>
+                <a:latin typeface="Calibri"/>
+                <a:ea typeface="Calibri"/>
+                <a:cs typeface="Calibri"/>
+                <a:sym typeface="Calibri"/>
+              </a:rPr>
+              <a:t>FloatingPanel</a:t>
+            </a:r>
+            <a:endParaRPr lang="en-US" sz="1050" b="1" dirty="0">
+              <a:solidFill>
+                <a:srgbClr val="76923C"/>
+              </a:solidFill>
+              <a:latin typeface="Calibri"/>
+              <a:ea typeface="Calibri"/>
+              <a:cs typeface="Calibri"/>
+              <a:sym typeface="Calibri"/>
+            </a:endParaRPr>
+          </a:p>
+        </p:txBody>
+      </p:sp>
+      <p:cxnSp>
+        <p:nvCxnSpPr>
+          <p:cNvPr id="48" name="Shape 204"/>
+          <p:cNvCxnSpPr>
+            <a:stCxn id="199" idx="2"/>
+            <a:endCxn id="45" idx="1"/>
+          </p:cNvCxnSpPr>
+          <p:nvPr/>
+        </p:nvCxnSpPr>
+        <p:spPr>
+          <a:xfrm rot="16200000" flipH="1">
+            <a:off x="1711696" y="3572452"/>
+            <a:ext cx="1592878" cy="184019"/>
+          </a:xfrm>
+          <a:prstGeom prst="bentConnector2">
+            <a:avLst/>
+          </a:prstGeom>
+          <a:gradFill>
+            <a:gsLst>
+              <a:gs pos="0">
+                <a:srgbClr val="FFA09D"/>
+              </a:gs>
+              <a:gs pos="35000">
+                <a:srgbClr val="FFBCBC"/>
+              </a:gs>
+              <a:gs pos="100000">
+                <a:srgbClr val="FFE2E2"/>
+              </a:gs>
+            </a:gsLst>
+            <a:lin ang="16200000" scaled="0"/>
+          </a:gradFill>
+          <a:ln w="19050" cap="flat" cmpd="sng">
+            <a:solidFill>
+              <a:schemeClr val="accent3"/>
+            </a:solidFill>
+            <a:prstDash val="solid"/>
+            <a:round/>
+            <a:headEnd type="none" w="med" len="med"/>
+            <a:tailEnd type="stealth" w="lg" len="lg"/>
+          </a:ln>
+        </p:spPr>
+      </p:cxnSp>
+      <p:sp>
+        <p:nvSpPr>
+          <p:cNvPr id="52" name="Shape 228"/>
+          <p:cNvSpPr/>
+          <p:nvPr/>
+        </p:nvSpPr>
+        <p:spPr>
+          <a:xfrm rot="10800000" flipH="1">
+            <a:off x="3703320" y="4465320"/>
+            <a:ext cx="3053672" cy="451886"/>
+          </a:xfrm>
+          <a:custGeom>
+            <a:avLst/>
+            <a:gdLst/>
+            <a:ahLst/>
+            <a:cxnLst/>
+            <a:rect l="0" t="0" r="0" b="0"/>
+            <a:pathLst>
+              <a:path w="120000" h="120000" extrusionOk="0">
+                <a:moveTo>
+                  <a:pt x="0" y="119999"/>
+                </a:moveTo>
+                <a:lnTo>
+                  <a:pt x="8727" y="0"/>
+                </a:lnTo>
+                <a:lnTo>
+                  <a:pt x="120000" y="0"/>
+                </a:lnTo>
+              </a:path>
+            </a:pathLst>
+          </a:custGeom>
+          <a:noFill/>
+          <a:ln w="19050" cap="flat" cmpd="sng">
+            <a:solidFill>
+              <a:schemeClr val="accent3"/>
+            </a:solidFill>
+            <a:prstDash val="dot"/>
+            <a:round/>
+            <a:headEnd type="none" w="med" len="med"/>
+            <a:tailEnd type="stealth" w="lg" len="lg"/>
+          </a:ln>
+        </p:spPr>
+        <p:txBody>
+          <a:bodyPr lIns="91425" tIns="45700" rIns="91425" bIns="45700" anchor="ctr" anchorCtr="0">
+            <a:noAutofit/>
+          </a:bodyPr>
+          <a:lstStyle/>
+          <a:p>
+            <a:pPr marL="0" marR="0" lvl="0" indent="0" algn="ctr" rtl="0">
+              <a:spcBef>
+                <a:spcPts val="0"/>
+              </a:spcBef>
+              <a:buNone/>
+            </a:pPr>
+            <a:endParaRPr sz="1800">
+              <a:solidFill>
+                <a:schemeClr val="dk1"/>
+              </a:solidFill>
+              <a:latin typeface="Calibri"/>
+              <a:ea typeface="Calibri"/>
+              <a:cs typeface="Calibri"/>
+              <a:sym typeface="Calibri"/>
+            </a:endParaRPr>
+          </a:p>
+        </p:txBody>
+      </p:sp>
+      <p:sp>
+        <p:nvSpPr>
+          <p:cNvPr id="53" name="Shape 228"/>
+          <p:cNvSpPr/>
+          <p:nvPr/>
+        </p:nvSpPr>
+        <p:spPr>
+          <a:xfrm rot="10800000" flipH="1">
+            <a:off x="3695700" y="3764280"/>
+            <a:ext cx="3068912" cy="451886"/>
+          </a:xfrm>
+          <a:custGeom>
+            <a:avLst/>
+            <a:gdLst/>
+            <a:ahLst/>
+            <a:cxnLst/>
+            <a:rect l="0" t="0" r="0" b="0"/>
+            <a:pathLst>
+              <a:path w="120000" h="120000" extrusionOk="0">
+                <a:moveTo>
+                  <a:pt x="0" y="119999"/>
+                </a:moveTo>
+                <a:lnTo>
+                  <a:pt x="8727" y="0"/>
+                </a:lnTo>
+                <a:lnTo>
+                  <a:pt x="120000" y="0"/>
+                </a:lnTo>
+              </a:path>
+            </a:pathLst>
+          </a:custGeom>
+          <a:noFill/>
+          <a:ln w="19050" cap="flat" cmpd="sng">
+            <a:solidFill>
+              <a:schemeClr val="accent3"/>
+            </a:solidFill>
+            <a:prstDash val="dot"/>
+            <a:round/>
+            <a:headEnd type="none" w="med" len="med"/>
+            <a:tailEnd type="stealth" w="lg" len="lg"/>
+          </a:ln>
+        </p:spPr>
+        <p:txBody>
+          <a:bodyPr lIns="91425" tIns="45700" rIns="91425" bIns="45700" anchor="ctr" anchorCtr="0">
+            <a:noAutofit/>
+          </a:bodyPr>
+          <a:lstStyle/>
+          <a:p>
+            <a:pPr marL="0" marR="0" lvl="0" indent="0" algn="ctr" rtl="0">
+              <a:spcBef>
+                <a:spcPts val="0"/>
+              </a:spcBef>
+              <a:buNone/>
+            </a:pPr>
+            <a:endParaRPr sz="1800">
+              <a:solidFill>
+                <a:schemeClr val="dk1"/>
+              </a:solidFill>
+              <a:latin typeface="Calibri"/>
+              <a:ea typeface="Calibri"/>
+              <a:cs typeface="Calibri"/>
+              <a:sym typeface="Calibri"/>
+            </a:endParaRPr>
+          </a:p>
+        </p:txBody>
+      </p:sp>
+    </p:spTree>
+  </p:cSld>
+  <p:clrMapOvr>
+    <a:masterClrMapping/>
+  </p:clrMapOvr>
+</p:sld>
+</file>
+
+<file path=ppt/slides/slide6.xml><?xml version="1.0" encoding="utf-8"?>
+<p:sld xmlns:a="http://schemas.openxmlformats.org/drawingml/2006/main" xmlns:r="http://schemas.openxmlformats.org/officeDocument/2006/relationships" xmlns:p="http://schemas.openxmlformats.org/presentationml/2006/main">
+  <p:cSld>
+    <p:spTree>
+      <p:nvGrpSpPr>
         <p:cNvPr id="1" name="Shape 232"/>
         <p:cNvGrpSpPr/>
         <p:nvPr/>
@@ -19924,7 +22576,7 @@
 </p:sld>
 </file>
 
-<file path=ppt/slides/slide6.xml><?xml version="1.0" encoding="utf-8"?>
+<file path=ppt/slides/slide7.xml><?xml version="1.0" encoding="utf-8"?>
 <p:sld xmlns:a="http://schemas.openxmlformats.org/drawingml/2006/main" xmlns:r="http://schemas.openxmlformats.org/officeDocument/2006/relationships" xmlns:p="http://schemas.openxmlformats.org/presentationml/2006/main">
   <p:cSld>
     <p:spTree>
@@ -21485,7 +24137,7 @@
 </p:sld>
 </file>
 
-<file path=ppt/slides/slide7.xml><?xml version="1.0" encoding="utf-8"?>
+<file path=ppt/slides/slide8.xml><?xml version="1.0" encoding="utf-8"?>
 <p:sld xmlns:a="http://schemas.openxmlformats.org/drawingml/2006/main" xmlns:r="http://schemas.openxmlformats.org/officeDocument/2006/relationships" xmlns:p="http://schemas.openxmlformats.org/presentationml/2006/main">
   <p:cSld>
     <p:spTree>
@@ -24922,7 +27574,7 @@
 </p:sld>
 </file>
 
-<file path=ppt/slides/slide8.xml><?xml version="1.0" encoding="utf-8"?>
+<file path=ppt/slides/slide9.xml><?xml version="1.0" encoding="utf-8"?>
 <p:sld xmlns:a="http://schemas.openxmlformats.org/drawingml/2006/main" xmlns:r="http://schemas.openxmlformats.org/officeDocument/2006/relationships" xmlns:p="http://schemas.openxmlformats.org/presentationml/2006/main">
   <p:cSld>
     <p:spTree>
@@ -26294,31 +28946,6 @@
           </a:ln>
         </p:spPr>
       </p:cxnSp>
-    </p:spTree>
-  </p:cSld>
-  <p:clrMapOvr>
-    <a:masterClrMapping/>
-  </p:clrMapOvr>
-</p:sld>
-</file>
-
-<file path=ppt/slides/slide9.xml><?xml version="1.0" encoding="utf-8"?>
-<p:sld xmlns:a="http://schemas.openxmlformats.org/drawingml/2006/main" xmlns:r="http://schemas.openxmlformats.org/officeDocument/2006/relationships" xmlns:p="http://schemas.openxmlformats.org/presentationml/2006/main">
-  <p:cSld>
-    <p:spTree>
-      <p:nvGrpSpPr>
-        <p:cNvPr id="1" name="Shape 389"/>
-        <p:cNvGrpSpPr/>
-        <p:nvPr/>
-      </p:nvGrpSpPr>
-      <p:grpSpPr>
-        <a:xfrm>
-          <a:off x="0" y="0"/>
-          <a:ext cx="0" cy="0"/>
-          <a:chOff x="0" y="0"/>
-          <a:chExt cx="0" cy="0"/>
-        </a:xfrm>
-      </p:grpSpPr>
     </p:spTree>
   </p:cSld>
   <p:clrMapOvr>

</xml_diff>

<commit_message>
Update SD for delete task
</commit_message>
<xml_diff>
--- a/docs/diagrams/Diagrams.pptx
+++ b/docs/diagrams/Diagrams.pptx
@@ -17952,7 +17952,7 @@
                 <a:cs typeface="Calibri"/>
                 <a:sym typeface="Calibri"/>
               </a:rPr>
-              <a:t>delete 1</a:t>
+              <a:t>delete d1</a:t>
             </a:r>
           </a:p>
         </p:txBody>
@@ -17991,8 +17991,8 @@
         </p:nvSpPr>
         <p:spPr>
           <a:xfrm>
-            <a:off x="2166172" y="1453379"/>
-            <a:ext cx="1424846" cy="215443"/>
+            <a:off x="1973208" y="1453379"/>
+            <a:ext cx="1617810" cy="271594"/>
           </a:xfrm>
           <a:prstGeom prst="rect">
             <a:avLst/>
@@ -18025,7 +18025,31 @@
                 <a:cs typeface="Calibri"/>
                 <a:sym typeface="Calibri"/>
               </a:rPr>
-              <a:t>execute(“delete 1”)</a:t>
+              <a:t>execute(“delete </a:t>
+            </a:r>
+            <a:r>
+              <a:rPr lang="en-US" dirty="0">
+                <a:solidFill>
+                  <a:srgbClr val="0070C0"/>
+                </a:solidFill>
+                <a:latin typeface="Calibri"/>
+                <a:ea typeface="Calibri"/>
+                <a:cs typeface="Calibri"/>
+                <a:sym typeface="Calibri"/>
+              </a:rPr>
+              <a:t>d</a:t>
+            </a:r>
+            <a:r>
+              <a:rPr lang="en-US" sz="1400" dirty="0">
+                <a:solidFill>
+                  <a:srgbClr val="0070C0"/>
+                </a:solidFill>
+                <a:latin typeface="Calibri"/>
+                <a:ea typeface="Calibri"/>
+                <a:cs typeface="Calibri"/>
+                <a:sym typeface="Calibri"/>
+              </a:rPr>
+              <a:t>1”)</a:t>
             </a:r>
           </a:p>
         </p:txBody>

</xml_diff>